<commit_message>
Fix some errors to equations in course materials
</commit_message>
<xml_diff>
--- a/Course Materials/Chapter02_Mathematics.pptx
+++ b/Course Materials/Chapter02_Mathematics.pptx
@@ -5,7 +5,7 @@
     <p:sldMasterId id="2147483648" r:id="rId4"/>
   </p:sldMasterIdLst>
   <p:notesMasterIdLst>
-    <p:notesMasterId r:id="rId55"/>
+    <p:notesMasterId r:id="rId58"/>
   </p:notesMasterIdLst>
   <p:sldIdLst>
     <p:sldId id="301" r:id="rId5"/>
@@ -46,18 +46,21 @@
     <p:sldId id="324" r:id="rId40"/>
     <p:sldId id="325" r:id="rId41"/>
     <p:sldId id="326" r:id="rId42"/>
-    <p:sldId id="327" r:id="rId43"/>
-    <p:sldId id="328" r:id="rId44"/>
-    <p:sldId id="341" r:id="rId45"/>
-    <p:sldId id="342" r:id="rId46"/>
-    <p:sldId id="345" r:id="rId47"/>
-    <p:sldId id="343" r:id="rId48"/>
-    <p:sldId id="344" r:id="rId49"/>
-    <p:sldId id="346" r:id="rId50"/>
-    <p:sldId id="347" r:id="rId51"/>
-    <p:sldId id="348" r:id="rId52"/>
-    <p:sldId id="349" r:id="rId53"/>
-    <p:sldId id="350" r:id="rId54"/>
+    <p:sldId id="353" r:id="rId43"/>
+    <p:sldId id="327" r:id="rId44"/>
+    <p:sldId id="351" r:id="rId45"/>
+    <p:sldId id="352" r:id="rId46"/>
+    <p:sldId id="328" r:id="rId47"/>
+    <p:sldId id="341" r:id="rId48"/>
+    <p:sldId id="342" r:id="rId49"/>
+    <p:sldId id="345" r:id="rId50"/>
+    <p:sldId id="343" r:id="rId51"/>
+    <p:sldId id="344" r:id="rId52"/>
+    <p:sldId id="346" r:id="rId53"/>
+    <p:sldId id="347" r:id="rId54"/>
+    <p:sldId id="348" r:id="rId55"/>
+    <p:sldId id="349" r:id="rId56"/>
+    <p:sldId id="350" r:id="rId57"/>
   </p:sldIdLst>
   <p:sldSz cx="12192000" cy="6858000"/>
   <p:notesSz cx="6858000" cy="9144000"/>
@@ -5754,7 +5757,7 @@
           <a:p>
             <a:fld id="{860E4C0E-3822-4470-875C-25F6E634D1E2}" type="datetimeFigureOut">
               <a:rPr lang="ko-KR" altLang="en-US" smtClean="0"/>
-              <a:t>2021-09-24</a:t>
+              <a:t>2022-01-01</a:t>
             </a:fld>
             <a:endParaRPr lang="ko-KR" altLang="en-US"/>
           </a:p>
@@ -6172,7 +6175,7 @@
           <a:p>
             <a:fld id="{3D067A03-45D1-4EAE-8DA0-F79B7BEE625A}" type="datetimeFigureOut">
               <a:rPr lang="ko-KR" altLang="en-US" smtClean="0"/>
-              <a:t>2021-09-24</a:t>
+              <a:t>2022-01-01</a:t>
             </a:fld>
             <a:endParaRPr lang="ko-KR" altLang="en-US"/>
           </a:p>
@@ -6896,7 +6899,7 @@
           <a:p>
             <a:fld id="{3D067A03-45D1-4EAE-8DA0-F79B7BEE625A}" type="datetimeFigureOut">
               <a:rPr lang="ko-KR" altLang="en-US" smtClean="0"/>
-              <a:t>2021-09-24</a:t>
+              <a:t>2022-01-01</a:t>
             </a:fld>
             <a:endParaRPr lang="ko-KR" altLang="en-US"/>
           </a:p>
@@ -7487,7 +7490,7 @@
           <a:p>
             <a:fld id="{3D067A03-45D1-4EAE-8DA0-F79B7BEE625A}" type="datetimeFigureOut">
               <a:rPr lang="ko-KR" altLang="en-US" smtClean="0"/>
-              <a:t>2021-09-24</a:t>
+              <a:t>2022-01-01</a:t>
             </a:fld>
             <a:endParaRPr lang="ko-KR" altLang="en-US"/>
           </a:p>
@@ -8003,7 +8006,7 @@
           <a:p>
             <a:fld id="{3D067A03-45D1-4EAE-8DA0-F79B7BEE625A}" type="datetimeFigureOut">
               <a:rPr lang="ko-KR" altLang="en-US" smtClean="0"/>
-              <a:t>2021-09-24</a:t>
+              <a:t>2022-01-01</a:t>
             </a:fld>
             <a:endParaRPr lang="ko-KR" altLang="en-US"/>
           </a:p>
@@ -8615,7 +8618,7 @@
           <a:p>
             <a:fld id="{3D067A03-45D1-4EAE-8DA0-F79B7BEE625A}" type="datetimeFigureOut">
               <a:rPr lang="ko-KR" altLang="en-US" smtClean="0"/>
-              <a:t>2021-09-24</a:t>
+              <a:t>2022-01-01</a:t>
             </a:fld>
             <a:endParaRPr lang="ko-KR" altLang="en-US"/>
           </a:p>
@@ -9269,7 +9272,7 @@
           <a:p>
             <a:fld id="{3D067A03-45D1-4EAE-8DA0-F79B7BEE625A}" type="datetimeFigureOut">
               <a:rPr lang="ko-KR" altLang="en-US" smtClean="0"/>
-              <a:t>2021-09-24</a:t>
+              <a:t>2022-01-01</a:t>
             </a:fld>
             <a:endParaRPr lang="ko-KR" altLang="en-US"/>
           </a:p>
@@ -9917,7 +9920,7 @@
           <a:p>
             <a:fld id="{3D067A03-45D1-4EAE-8DA0-F79B7BEE625A}" type="datetimeFigureOut">
               <a:rPr lang="ko-KR" altLang="en-US" smtClean="0"/>
-              <a:t>2021-09-24</a:t>
+              <a:t>2022-01-01</a:t>
             </a:fld>
             <a:endParaRPr lang="ko-KR" altLang="en-US"/>
           </a:p>
@@ -10712,7 +10715,7 @@
           <a:p>
             <a:fld id="{3D067A03-45D1-4EAE-8DA0-F79B7BEE625A}" type="datetimeFigureOut">
               <a:rPr lang="ko-KR" altLang="en-US" smtClean="0"/>
-              <a:t>2021-09-24</a:t>
+              <a:t>2022-01-01</a:t>
             </a:fld>
             <a:endParaRPr lang="ko-KR" altLang="en-US"/>
           </a:p>
@@ -11236,7 +11239,7 @@
           <a:p>
             <a:fld id="{3D067A03-45D1-4EAE-8DA0-F79B7BEE625A}" type="datetimeFigureOut">
               <a:rPr lang="ko-KR" altLang="en-US" smtClean="0"/>
-              <a:t>2021-09-24</a:t>
+              <a:t>2022-01-01</a:t>
             </a:fld>
             <a:endParaRPr lang="ko-KR" altLang="en-US"/>
           </a:p>
@@ -11724,7 +11727,7 @@
           <a:p>
             <a:fld id="{3D067A03-45D1-4EAE-8DA0-F79B7BEE625A}" type="datetimeFigureOut">
               <a:rPr lang="ko-KR" altLang="en-US" smtClean="0"/>
-              <a:t>2021-09-24</a:t>
+              <a:t>2022-01-01</a:t>
             </a:fld>
             <a:endParaRPr lang="ko-KR" altLang="en-US"/>
           </a:p>
@@ -12434,7 +12437,7 @@
           <a:p>
             <a:fld id="{3D067A03-45D1-4EAE-8DA0-F79B7BEE625A}" type="datetimeFigureOut">
               <a:rPr lang="ko-KR" altLang="en-US" smtClean="0"/>
-              <a:t>2021-09-24</a:t>
+              <a:t>2022-01-01</a:t>
             </a:fld>
             <a:endParaRPr lang="ko-KR" altLang="en-US"/>
           </a:p>
@@ -13101,7 +13104,7 @@
           <a:p>
             <a:fld id="{3D067A03-45D1-4EAE-8DA0-F79B7BEE625A}" type="datetimeFigureOut">
               <a:rPr lang="ko-KR" altLang="en-US" smtClean="0"/>
-              <a:t>2021-09-24</a:t>
+              <a:t>2022-01-01</a:t>
             </a:fld>
             <a:endParaRPr lang="ko-KR" altLang="en-US"/>
           </a:p>
@@ -13717,7 +13720,7 @@
           <a:p>
             <a:fld id="{3D067A03-45D1-4EAE-8DA0-F79B7BEE625A}" type="datetimeFigureOut">
               <a:rPr lang="ko-KR" altLang="en-US" smtClean="0"/>
-              <a:t>2021-09-24</a:t>
+              <a:t>2022-01-01</a:t>
             </a:fld>
             <a:endParaRPr lang="ko-KR" altLang="en-US"/>
           </a:p>
@@ -37519,8 +37522,8 @@
           </a:p>
         </p:txBody>
       </p:sp>
-      <mc:AlternateContent xmlns:mc="http://schemas.openxmlformats.org/markup-compatibility/2006" xmlns:a14="http://schemas.microsoft.com/office/drawing/2010/main">
-        <mc:Choice Requires="a14">
+      <mc:AlternateContent xmlns:mc="http://schemas.openxmlformats.org/markup-compatibility/2006">
+        <mc:Choice xmlns:a14="http://schemas.microsoft.com/office/drawing/2010/main" Requires="a14">
           <p:sp>
             <p:nvSpPr>
               <p:cNvPr id="3" name="내용 개체 틀 2">
@@ -37560,6 +37563,14 @@
                 <a:r>
                   <a:rPr lang="ko-KR" altLang="en-US" dirty="0"/>
                   <a:t>에서 주로 다룰 예정</a:t>
+                </a:r>
+                <a:r>
+                  <a:rPr lang="en-US" altLang="ko-KR" dirty="0"/>
+                  <a:t>, n</a:t>
+                </a:r>
+                <a:r>
+                  <a:rPr lang="ko-KR" altLang="en-US" dirty="0"/>
+                  <a:t>개의 입력에 대해</a:t>
                 </a:r>
                 <a:endParaRPr lang="en-US" altLang="ko-KR" dirty="0"/>
               </a:p>
@@ -37930,7 +37941,7 @@
             </p:txBody>
           </p:sp>
         </mc:Choice>
-        <mc:Fallback xmlns="">
+        <mc:Fallback>
           <p:sp>
             <p:nvSpPr>
               <p:cNvPr id="3" name="내용 개체 틀 2">
@@ -38028,8 +38039,8 @@
           </a:p>
         </p:txBody>
       </p:sp>
-      <mc:AlternateContent xmlns:mc="http://schemas.openxmlformats.org/markup-compatibility/2006" xmlns:a14="http://schemas.microsoft.com/office/drawing/2010/main">
-        <mc:Choice Requires="a14">
+      <mc:AlternateContent xmlns:mc="http://schemas.openxmlformats.org/markup-compatibility/2006">
+        <mc:Choice xmlns:a14="http://schemas.microsoft.com/office/drawing/2010/main" Requires="a14">
           <p:sp>
             <p:nvSpPr>
               <p:cNvPr id="3" name="내용 개체 틀 2">
@@ -38073,6 +38084,36 @@
                 <a:r>
                   <a:rPr lang="ko-KR" altLang="en-US" dirty="0"/>
                   <a:t>에서 주로 다룰 예정</a:t>
+                </a:r>
+                <a:br>
+                  <a:rPr lang="en-US" altLang="ko-KR" dirty="0"/>
+                </a:br>
+                <a:r>
+                  <a:rPr lang="ko-KR" altLang="en-US" dirty="0"/>
+                  <a:t>앞으로 다룰 </a:t>
+                </a:r>
+                <a:r>
+                  <a:rPr lang="en-US" altLang="ko-KR" dirty="0"/>
+                  <a:t>BCE</a:t>
+                </a:r>
+                <a:r>
+                  <a:rPr lang="ko-KR" altLang="en-US" dirty="0"/>
+                  <a:t>와 </a:t>
+                </a:r>
+                <a:r>
+                  <a:rPr lang="en-US" altLang="ko-KR" dirty="0"/>
+                  <a:t>CE</a:t>
+                </a:r>
+                <a:r>
+                  <a:rPr lang="ko-KR" altLang="en-US" dirty="0"/>
+                  <a:t>는 편의를 위해</a:t>
+                </a:r>
+                <a:br>
+                  <a:rPr lang="en-US" altLang="ko-KR" dirty="0"/>
+                </a:br>
+                <a:r>
+                  <a:rPr lang="ko-KR" altLang="en-US" dirty="0"/>
+                  <a:t>하나의 입력에 대한 출력을 사용</a:t>
                 </a:r>
                 <a:endParaRPr lang="en-US" altLang="ko-KR" dirty="0"/>
               </a:p>
@@ -38120,244 +38161,59 @@
                       <a:rPr lang="en-US" altLang="ko-KR" b="0" i="1" dirty="0" smtClean="0">
                         <a:latin typeface="Cambria Math" panose="02040503050406030204" pitchFamily="18" charset="0"/>
                       </a:rPr>
-                      <m:t>=−</m:t>
+                      <m:t>=</m:t>
                     </m:r>
-                    <m:f>
-                      <m:fPr>
+                    <m:r>
+                      <a:rPr lang="en-US" altLang="ko-KR" b="0" i="1" dirty="0" smtClean="0">
+                        <a:latin typeface="Cambria Math" panose="02040503050406030204" pitchFamily="18" charset="0"/>
+                      </a:rPr>
+                      <m:t>−</m:t>
+                    </m:r>
+                    <m:r>
+                      <a:rPr lang="en-US" altLang="ko-KR" b="0" i="1" dirty="0" smtClean="0">
+                        <a:latin typeface="Cambria Math" panose="02040503050406030204" pitchFamily="18" charset="0"/>
+                      </a:rPr>
+                      <m:t>𝑦</m:t>
+                    </m:r>
+                    <m:func>
+                      <m:funcPr>
                         <m:ctrlPr>
-                          <a:rPr lang="en-US" altLang="ko-KR" b="0" i="1" dirty="0" smtClean="0">
+                          <a:rPr lang="en-US" altLang="ko-KR" i="1" dirty="0">
                             <a:latin typeface="Cambria Math" panose="02040503050406030204" pitchFamily="18" charset="0"/>
                           </a:rPr>
                         </m:ctrlPr>
-                      </m:fPr>
-                      <m:num>
+                      </m:funcPr>
+                      <m:fName>
                         <m:r>
-                          <a:rPr lang="en-US" altLang="ko-KR" b="0" i="1" dirty="0" smtClean="0">
+                          <m:rPr>
+                            <m:sty m:val="p"/>
+                          </m:rPr>
+                          <a:rPr lang="en-US" altLang="ko-KR" dirty="0">
                             <a:latin typeface="Cambria Math" panose="02040503050406030204" pitchFamily="18" charset="0"/>
                           </a:rPr>
-                          <m:t>1</m:t>
+                          <m:t>log</m:t>
                         </m:r>
-                      </m:num>
-                      <m:den>
-                        <m:r>
-                          <a:rPr lang="en-US" altLang="ko-KR" b="0" i="1" dirty="0" smtClean="0">
-                            <a:latin typeface="Cambria Math" panose="02040503050406030204" pitchFamily="18" charset="0"/>
-                          </a:rPr>
-                          <m:t>𝑛</m:t>
-                        </m:r>
-                      </m:den>
-                    </m:f>
-                    <m:nary>
-                      <m:naryPr>
-                        <m:chr m:val="∑"/>
-                        <m:ctrlPr>
-                          <a:rPr lang="en-US" altLang="ko-KR" b="0" i="1" dirty="0" smtClean="0">
-                            <a:latin typeface="Cambria Math" panose="02040503050406030204" pitchFamily="18" charset="0"/>
-                          </a:rPr>
-                        </m:ctrlPr>
-                      </m:naryPr>
-                      <m:sub>
-                        <m:r>
-                          <a:rPr lang="en-US" altLang="ko-KR" b="0" i="1" dirty="0" smtClean="0">
-                            <a:latin typeface="Cambria Math" panose="02040503050406030204" pitchFamily="18" charset="0"/>
-                          </a:rPr>
-                          <m:t>𝑖</m:t>
-                        </m:r>
-                        <m:r>
-                          <a:rPr lang="en-US" altLang="ko-KR" b="0" i="1" dirty="0" smtClean="0">
-                            <a:latin typeface="Cambria Math" panose="02040503050406030204" pitchFamily="18" charset="0"/>
-                          </a:rPr>
-                          <m:t>=1</m:t>
-                        </m:r>
-                      </m:sub>
-                      <m:sup>
-                        <m:r>
-                          <a:rPr lang="en-US" altLang="ko-KR" b="0" i="1" dirty="0" smtClean="0">
-                            <a:latin typeface="Cambria Math" panose="02040503050406030204" pitchFamily="18" charset="0"/>
-                          </a:rPr>
-                          <m:t>𝑛</m:t>
-                        </m:r>
-                      </m:sup>
+                      </m:fName>
                       <m:e>
-                        <m:r>
-                          <a:rPr lang="en-US" altLang="ko-KR" b="0" i="1" dirty="0" smtClean="0">
-                            <a:latin typeface="Cambria Math" panose="02040503050406030204" pitchFamily="18" charset="0"/>
-                          </a:rPr>
-                          <m:t>{</m:t>
-                        </m:r>
-                        <m:sSub>
-                          <m:sSubPr>
-                            <m:ctrlPr>
-                              <a:rPr lang="en-US" altLang="ko-KR" b="0" i="1" dirty="0" smtClean="0">
-                                <a:latin typeface="Cambria Math" panose="02040503050406030204" pitchFamily="18" charset="0"/>
-                              </a:rPr>
-                            </m:ctrlPr>
-                          </m:sSubPr>
-                          <m:e>
-                            <m:r>
-                              <a:rPr lang="en-US" altLang="ko-KR" b="0" i="1" dirty="0" smtClean="0">
-                                <a:latin typeface="Cambria Math" panose="02040503050406030204" pitchFamily="18" charset="0"/>
-                              </a:rPr>
-                              <m:t>𝑦</m:t>
-                            </m:r>
-                          </m:e>
-                          <m:sub>
-                            <m:r>
-                              <a:rPr lang="en-US" altLang="ko-KR" b="0" i="1" dirty="0" smtClean="0">
-                                <a:latin typeface="Cambria Math" panose="02040503050406030204" pitchFamily="18" charset="0"/>
-                              </a:rPr>
-                              <m:t>𝑖</m:t>
-                            </m:r>
-                          </m:sub>
-                        </m:sSub>
-                        <m:func>
-                          <m:funcPr>
-                            <m:ctrlPr>
-                              <a:rPr lang="en-US" altLang="ko-KR" b="0" i="1" dirty="0" smtClean="0">
-                                <a:latin typeface="Cambria Math" panose="02040503050406030204" pitchFamily="18" charset="0"/>
-                              </a:rPr>
-                            </m:ctrlPr>
-                          </m:funcPr>
-                          <m:fName>
-                            <m:r>
-                              <m:rPr>
-                                <m:sty m:val="p"/>
-                              </m:rPr>
-                              <a:rPr lang="en-US" altLang="ko-KR" b="0" i="0" dirty="0" smtClean="0">
-                                <a:latin typeface="Cambria Math" panose="02040503050406030204" pitchFamily="18" charset="0"/>
-                              </a:rPr>
-                              <m:t>log</m:t>
-                            </m:r>
-                          </m:fName>
-                          <m:e>
-                            <m:d>
-                              <m:dPr>
-                                <m:ctrlPr>
-                                  <a:rPr lang="en-US" altLang="ko-KR" b="0" i="1" dirty="0" smtClean="0">
-                                    <a:latin typeface="Cambria Math" panose="02040503050406030204" pitchFamily="18" charset="0"/>
-                                  </a:rPr>
-                                </m:ctrlPr>
-                              </m:dPr>
-                              <m:e>
-                                <m:r>
-                                  <a:rPr lang="en-US" altLang="ko-KR" i="1">
-                                    <a:latin typeface="Cambria Math" panose="02040503050406030204" pitchFamily="18" charset="0"/>
-                                  </a:rPr>
-                                  <m:t>𝜎</m:t>
-                                </m:r>
-                                <m:r>
-                                  <a:rPr lang="en-US" altLang="ko-KR" b="0" i="1" dirty="0" smtClean="0">
-                                    <a:latin typeface="Cambria Math" panose="02040503050406030204" pitchFamily="18" charset="0"/>
-                                  </a:rPr>
-                                  <m:t>(</m:t>
-                                </m:r>
-                                <m:sSub>
-                                  <m:sSubPr>
-                                    <m:ctrlPr>
-                                      <a:rPr lang="en-US" altLang="ko-KR" b="0" i="1" dirty="0" smtClean="0">
-                                        <a:latin typeface="Cambria Math" panose="02040503050406030204" pitchFamily="18" charset="0"/>
-                                      </a:rPr>
-                                    </m:ctrlPr>
-                                  </m:sSubPr>
-                                  <m:e>
-                                    <m:r>
-                                      <a:rPr lang="en-US" altLang="ko-KR" b="0" i="1" dirty="0" smtClean="0">
-                                        <a:latin typeface="Cambria Math" panose="02040503050406030204" pitchFamily="18" charset="0"/>
-                                      </a:rPr>
-                                      <m:t>𝑜</m:t>
-                                    </m:r>
-                                  </m:e>
-                                  <m:sub>
-                                    <m:r>
-                                      <a:rPr lang="en-US" altLang="ko-KR" b="0" i="1" dirty="0" smtClean="0">
-                                        <a:latin typeface="Cambria Math" panose="02040503050406030204" pitchFamily="18" charset="0"/>
-                                      </a:rPr>
-                                      <m:t>𝑖</m:t>
-                                    </m:r>
-                                  </m:sub>
-                                </m:sSub>
-                                <m:r>
-                                  <a:rPr lang="en-US" altLang="ko-KR" b="0" i="1" dirty="0" smtClean="0">
-                                    <a:latin typeface="Cambria Math" panose="02040503050406030204" pitchFamily="18" charset="0"/>
-                                  </a:rPr>
-                                  <m:t>)</m:t>
-                                </m:r>
-                              </m:e>
-                            </m:d>
-                          </m:e>
-                        </m:func>
-                        <m:r>
-                          <a:rPr lang="en-US" altLang="ko-KR" b="0" i="1" dirty="0" smtClean="0">
-                            <a:latin typeface="Cambria Math" panose="02040503050406030204" pitchFamily="18" charset="0"/>
-                          </a:rPr>
-                          <m:t>+</m:t>
-                        </m:r>
                         <m:d>
                           <m:dPr>
                             <m:ctrlPr>
-                              <a:rPr lang="en-US" altLang="ko-KR" b="0" i="1" dirty="0" smtClean="0">
+                              <a:rPr lang="en-US" altLang="ko-KR" i="1" dirty="0">
                                 <a:latin typeface="Cambria Math" panose="02040503050406030204" pitchFamily="18" charset="0"/>
                               </a:rPr>
                             </m:ctrlPr>
                           </m:dPr>
                           <m:e>
                             <m:r>
-                              <a:rPr lang="en-US" altLang="ko-KR" b="0" i="1" dirty="0" smtClean="0">
+                              <a:rPr lang="en-US" altLang="ko-KR" i="1">
                                 <a:latin typeface="Cambria Math" panose="02040503050406030204" pitchFamily="18" charset="0"/>
                               </a:rPr>
-                              <m:t>1−</m:t>
+                              <m:t>𝜎</m:t>
                             </m:r>
-                            <m:sSub>
-                              <m:sSubPr>
-                                <m:ctrlPr>
-                                  <a:rPr lang="en-US" altLang="ko-KR" b="0" i="1" dirty="0" smtClean="0">
-                                    <a:latin typeface="Cambria Math" panose="02040503050406030204" pitchFamily="18" charset="0"/>
-                                  </a:rPr>
-                                </m:ctrlPr>
-                              </m:sSubPr>
-                              <m:e>
-                                <m:r>
-                                  <a:rPr lang="en-US" altLang="ko-KR" b="0" i="1" dirty="0" smtClean="0">
-                                    <a:latin typeface="Cambria Math" panose="02040503050406030204" pitchFamily="18" charset="0"/>
-                                  </a:rPr>
-                                  <m:t>𝑦</m:t>
-                                </m:r>
-                              </m:e>
-                              <m:sub>
-                                <m:r>
-                                  <a:rPr lang="en-US" altLang="ko-KR" b="0" i="1" dirty="0" smtClean="0">
-                                    <a:latin typeface="Cambria Math" panose="02040503050406030204" pitchFamily="18" charset="0"/>
-                                  </a:rPr>
-                                  <m:t>𝑖</m:t>
-                                </m:r>
-                              </m:sub>
-                            </m:sSub>
-                          </m:e>
-                        </m:d>
-                        <m:func>
-                          <m:funcPr>
-                            <m:ctrlPr>
-                              <a:rPr lang="en-US" altLang="ko-KR" b="0" i="1" dirty="0" smtClean="0">
-                                <a:latin typeface="Cambria Math" panose="02040503050406030204" pitchFamily="18" charset="0"/>
-                              </a:rPr>
-                            </m:ctrlPr>
-                          </m:funcPr>
-                          <m:fName>
-                            <m:r>
-                              <m:rPr>
-                                <m:sty m:val="p"/>
-                              </m:rPr>
-                              <a:rPr lang="en-US" altLang="ko-KR" b="0" i="0" dirty="0" smtClean="0">
-                                <a:latin typeface="Cambria Math" panose="02040503050406030204" pitchFamily="18" charset="0"/>
-                              </a:rPr>
-                              <m:t>log</m:t>
-                            </m:r>
-                          </m:fName>
-                          <m:e>
                             <m:d>
                               <m:dPr>
                                 <m:ctrlPr>
-                                  <a:rPr lang="en-US" altLang="ko-KR" b="0" i="1" dirty="0" smtClean="0">
+                                  <a:rPr lang="en-US" altLang="ko-KR" i="1" dirty="0">
                                     <a:latin typeface="Cambria Math" panose="02040503050406030204" pitchFamily="18" charset="0"/>
                                   </a:rPr>
                                 </m:ctrlPr>
@@ -38367,63 +38223,106 @@
                                   <a:rPr lang="en-US" altLang="ko-KR" b="0" i="1" dirty="0" smtClean="0">
                                     <a:latin typeface="Cambria Math" panose="02040503050406030204" pitchFamily="18" charset="0"/>
                                   </a:rPr>
-                                  <m:t>1−</m:t>
-                                </m:r>
-                                <m:sSub>
-                                  <m:sSubPr>
-                                    <m:ctrlPr>
-                                      <a:rPr lang="en-US" altLang="ko-KR" b="0" i="1" dirty="0" smtClean="0">
-                                        <a:latin typeface="Cambria Math" panose="02040503050406030204" pitchFamily="18" charset="0"/>
-                                      </a:rPr>
-                                    </m:ctrlPr>
-                                  </m:sSubPr>
-                                  <m:e>
-                                    <m:r>
-                                      <a:rPr lang="en-US" altLang="ko-KR" i="1">
-                                        <a:latin typeface="Cambria Math" panose="02040503050406030204" pitchFamily="18" charset="0"/>
-                                      </a:rPr>
-                                      <m:t>𝜎</m:t>
-                                    </m:r>
-                                    <m:r>
-                                      <a:rPr lang="en-US" altLang="ko-KR" b="0" i="1" dirty="0" smtClean="0">
-                                        <a:latin typeface="Cambria Math" panose="02040503050406030204" pitchFamily="18" charset="0"/>
-                                      </a:rPr>
-                                      <m:t>(</m:t>
-                                    </m:r>
-                                    <m:r>
-                                      <a:rPr lang="en-US" altLang="ko-KR" b="0" i="1" dirty="0" smtClean="0">
-                                        <a:latin typeface="Cambria Math" panose="02040503050406030204" pitchFamily="18" charset="0"/>
-                                      </a:rPr>
-                                      <m:t>𝑜</m:t>
-                                    </m:r>
-                                  </m:e>
-                                  <m:sub>
-                                    <m:r>
-                                      <a:rPr lang="en-US" altLang="ko-KR" b="0" i="1" dirty="0" smtClean="0">
-                                        <a:latin typeface="Cambria Math" panose="02040503050406030204" pitchFamily="18" charset="0"/>
-                                      </a:rPr>
-                                      <m:t>𝑖</m:t>
-                                    </m:r>
-                                  </m:sub>
-                                </m:sSub>
-                                <m:r>
-                                  <a:rPr lang="en-US" altLang="ko-KR" b="0" i="1" dirty="0" smtClean="0">
-                                    <a:latin typeface="Cambria Math" panose="02040503050406030204" pitchFamily="18" charset="0"/>
-                                  </a:rPr>
-                                  <m:t>)</m:t>
+                                  <m:t>𝑜</m:t>
                                 </m:r>
                               </m:e>
                             </m:d>
                           </m:e>
-                        </m:func>
+                        </m:d>
+                      </m:e>
+                    </m:func>
+                    <m:r>
+                      <a:rPr lang="en-US" altLang="ko-KR" b="0" i="1" dirty="0" smtClean="0">
+                        <a:latin typeface="Cambria Math" panose="02040503050406030204" pitchFamily="18" charset="0"/>
+                      </a:rPr>
+                      <m:t>−</m:t>
+                    </m:r>
+                    <m:d>
+                      <m:dPr>
+                        <m:ctrlPr>
+                          <a:rPr lang="en-US" altLang="ko-KR" i="1" dirty="0">
+                            <a:latin typeface="Cambria Math" panose="02040503050406030204" pitchFamily="18" charset="0"/>
+                          </a:rPr>
+                        </m:ctrlPr>
+                      </m:dPr>
+                      <m:e>
+                        <m:r>
+                          <a:rPr lang="en-US" altLang="ko-KR" i="1" dirty="0">
+                            <a:latin typeface="Cambria Math" panose="02040503050406030204" pitchFamily="18" charset="0"/>
+                          </a:rPr>
+                          <m:t>1−</m:t>
+                        </m:r>
                         <m:r>
                           <a:rPr lang="en-US" altLang="ko-KR" b="0" i="1" dirty="0" smtClean="0">
                             <a:latin typeface="Cambria Math" panose="02040503050406030204" pitchFamily="18" charset="0"/>
                           </a:rPr>
-                          <m:t>}</m:t>
+                          <m:t>𝑦</m:t>
                         </m:r>
                       </m:e>
-                    </m:nary>
+                    </m:d>
+                    <m:func>
+                      <m:funcPr>
+                        <m:ctrlPr>
+                          <a:rPr lang="en-US" altLang="ko-KR" i="1" dirty="0">
+                            <a:latin typeface="Cambria Math" panose="02040503050406030204" pitchFamily="18" charset="0"/>
+                          </a:rPr>
+                        </m:ctrlPr>
+                      </m:funcPr>
+                      <m:fName>
+                        <m:r>
+                          <m:rPr>
+                            <m:sty m:val="p"/>
+                          </m:rPr>
+                          <a:rPr lang="en-US" altLang="ko-KR" dirty="0">
+                            <a:latin typeface="Cambria Math" panose="02040503050406030204" pitchFamily="18" charset="0"/>
+                          </a:rPr>
+                          <m:t>log</m:t>
+                        </m:r>
+                      </m:fName>
+                      <m:e>
+                        <m:d>
+                          <m:dPr>
+                            <m:ctrlPr>
+                              <a:rPr lang="en-US" altLang="ko-KR" i="1" dirty="0">
+                                <a:latin typeface="Cambria Math" panose="02040503050406030204" pitchFamily="18" charset="0"/>
+                              </a:rPr>
+                            </m:ctrlPr>
+                          </m:dPr>
+                          <m:e>
+                            <m:r>
+                              <a:rPr lang="en-US" altLang="ko-KR" i="1" dirty="0">
+                                <a:latin typeface="Cambria Math" panose="02040503050406030204" pitchFamily="18" charset="0"/>
+                              </a:rPr>
+                              <m:t>1−</m:t>
+                            </m:r>
+                            <m:r>
+                              <a:rPr lang="en-US" altLang="ko-KR" b="0" i="1" dirty="0" smtClean="0">
+                                <a:latin typeface="Cambria Math" panose="02040503050406030204" pitchFamily="18" charset="0"/>
+                              </a:rPr>
+                              <m:t>𝜎</m:t>
+                            </m:r>
+                            <m:r>
+                              <a:rPr lang="en-US" altLang="ko-KR" b="0" i="1" dirty="0" smtClean="0">
+                                <a:latin typeface="Cambria Math" panose="02040503050406030204" pitchFamily="18" charset="0"/>
+                              </a:rPr>
+                              <m:t>(</m:t>
+                            </m:r>
+                            <m:r>
+                              <a:rPr lang="en-US" altLang="ko-KR" b="0" i="1" dirty="0" smtClean="0">
+                                <a:latin typeface="Cambria Math" panose="02040503050406030204" pitchFamily="18" charset="0"/>
+                              </a:rPr>
+                              <m:t>𝑜</m:t>
+                            </m:r>
+                            <m:r>
+                              <a:rPr lang="en-US" altLang="ko-KR" i="1" dirty="0">
+                                <a:latin typeface="Cambria Math" panose="02040503050406030204" pitchFamily="18" charset="0"/>
+                              </a:rPr>
+                              <m:t>)</m:t>
+                            </m:r>
+                          </m:e>
+                        </m:d>
+                      </m:e>
+                    </m:func>
                   </m:oMath>
                 </a14:m>
                 <a:endParaRPr lang="en-US" altLang="ko-KR" dirty="0"/>
@@ -38544,7 +38443,7 @@
             </p:txBody>
           </p:sp>
         </mc:Choice>
-        <mc:Fallback xmlns="">
+        <mc:Fallback>
           <p:sp>
             <p:nvSpPr>
               <p:cNvPr id="3" name="내용 개체 틀 2">
@@ -38623,7 +38522,7 @@
           <p:cNvPr id="2" name="제목 1">
             <a:extLst>
               <a:ext uri="{FF2B5EF4-FFF2-40B4-BE49-F238E27FC236}">
-                <a16:creationId xmlns:a16="http://schemas.microsoft.com/office/drawing/2014/main" id="{7ECB54A6-FA4F-4BA7-A012-260F31DF9334}"/>
+                <a16:creationId xmlns:a16="http://schemas.microsoft.com/office/drawing/2014/main" id="{75BC019F-DE1B-4D8B-9A49-ADCD3E825CE2}"/>
               </a:ext>
             </a:extLst>
           </p:cNvPr>
@@ -38646,14 +38545,14 @@
           </a:p>
         </p:txBody>
       </p:sp>
-      <mc:AlternateContent xmlns:mc="http://schemas.openxmlformats.org/markup-compatibility/2006" xmlns:a14="http://schemas.microsoft.com/office/drawing/2010/main">
-        <mc:Choice Requires="a14">
+      <mc:AlternateContent xmlns:mc="http://schemas.openxmlformats.org/markup-compatibility/2006">
+        <mc:Choice xmlns:a14="http://schemas.microsoft.com/office/drawing/2010/main" Requires="a14">
           <p:sp>
             <p:nvSpPr>
               <p:cNvPr id="3" name="내용 개체 틀 2">
                 <a:extLst>
                   <a:ext uri="{FF2B5EF4-FFF2-40B4-BE49-F238E27FC236}">
-                    <a16:creationId xmlns:a16="http://schemas.microsoft.com/office/drawing/2014/main" id="{EABA7002-F9E4-4335-90C3-263538207351}"/>
+                    <a16:creationId xmlns:a16="http://schemas.microsoft.com/office/drawing/2014/main" id="{13E156F2-B457-47E5-8103-FBA70AC58F60}"/>
                   </a:ext>
                 </a:extLst>
               </p:cNvPr>
@@ -38671,34 +38570,42 @@
               <a:p>
                 <a:r>
                   <a:rPr lang="en-US" altLang="ko-KR" dirty="0"/>
-                  <a:t>Cross Entropy(CE)</a:t>
+                  <a:t>Binary Cross Entropy </a:t>
+                </a:r>
+                <a:r>
+                  <a:rPr lang="ko-KR" altLang="en-US" dirty="0"/>
+                  <a:t>예시</a:t>
                 </a:r>
                 <a:br>
                   <a:rPr lang="en-US" altLang="ko-KR" dirty="0"/>
                 </a:br>
                 <a:r>
+                  <a:rPr lang="ko-KR" altLang="en-US" dirty="0"/>
+                  <a:t>실제 값이 </a:t>
+                </a:r>
+                <a:r>
                   <a:rPr lang="en-US" altLang="ko-KR" dirty="0"/>
-                  <a:t>k</a:t>
+                  <a:t>1</a:t>
                 </a:r>
                 <a:r>
                   <a:rPr lang="ko-KR" altLang="en-US" dirty="0"/>
-                  <a:t>개 클래스에 대한 예측 문제라면</a:t>
+                  <a:t>인 데이터에 대해</a:t>
                 </a:r>
                 <a:r>
                   <a:rPr lang="en-US" altLang="ko-KR" dirty="0"/>
-                  <a:t>, o</a:t>
+                  <a:t>, </a:t>
                 </a:r>
                 <a:r>
                   <a:rPr lang="ko-KR" altLang="en-US" dirty="0"/>
-                  <a:t>는 </a:t>
+                  <a:t>모델이</a:t>
                 </a:r>
                 <a:r>
                   <a:rPr lang="en-US" altLang="ko-KR" dirty="0"/>
-                  <a:t>n x k </a:t>
+                  <a:t> 0.75</a:t>
                 </a:r>
                 <a:r>
                   <a:rPr lang="ko-KR" altLang="en-US" dirty="0"/>
-                  <a:t>크기의 형태</a:t>
+                  <a:t>라고 예측</a:t>
                 </a:r>
                 <a:br>
                   <a:rPr lang="en-US" altLang="ko-KR" dirty="0"/>
@@ -38709,7 +38616,38 @@
                       <a:rPr lang="en-US" altLang="ko-KR" b="0" i="1" smtClean="0">
                         <a:latin typeface="Cambria Math" panose="02040503050406030204" pitchFamily="18" charset="0"/>
                       </a:rPr>
-                      <m:t>𝐽</m:t>
+                      <m:t>𝑜</m:t>
+                    </m:r>
+                    <m:r>
+                      <a:rPr lang="en-US" altLang="ko-KR" b="0" i="1" smtClean="0">
+                        <a:latin typeface="Cambria Math" panose="02040503050406030204" pitchFamily="18" charset="0"/>
+                      </a:rPr>
+                      <m:t>=0.75, </m:t>
+                    </m:r>
+                    <m:r>
+                      <a:rPr lang="en-US" altLang="ko-KR" b="0" i="1" smtClean="0">
+                        <a:latin typeface="Cambria Math" panose="02040503050406030204" pitchFamily="18" charset="0"/>
+                      </a:rPr>
+                      <m:t>𝑦</m:t>
+                    </m:r>
+                    <m:r>
+                      <a:rPr lang="en-US" altLang="ko-KR" b="0" i="1" smtClean="0">
+                        <a:latin typeface="Cambria Math" panose="02040503050406030204" pitchFamily="18" charset="0"/>
+                      </a:rPr>
+                      <m:t>=1</m:t>
+                    </m:r>
+                  </m:oMath>
+                </a14:m>
+                <a:br>
+                  <a:rPr lang="en-US" altLang="ko-KR" dirty="0"/>
+                </a:br>
+                <a14:m>
+                  <m:oMath xmlns:m="http://schemas.openxmlformats.org/officeDocument/2006/math">
+                    <m:r>
+                      <a:rPr lang="en-US" altLang="ko-KR" b="0" i="1" smtClean="0">
+                        <a:latin typeface="Cambria Math" panose="02040503050406030204" pitchFamily="18" charset="0"/>
+                      </a:rPr>
+                      <m:t>𝑠𝑖𝑔𝑚𝑜𝑖𝑑</m:t>
                     </m:r>
                     <m:d>
                       <m:dPr>
@@ -38721,13 +38659,10 @@
                       </m:dPr>
                       <m:e>
                         <m:r>
-                          <m:rPr>
-                            <m:sty m:val="p"/>
-                          </m:rPr>
-                          <a:rPr lang="en-US" altLang="ko-KR" b="0" i="0" smtClean="0">
+                          <a:rPr lang="en-US" altLang="ko-KR" b="0" i="1" smtClean="0">
                             <a:latin typeface="Cambria Math" panose="02040503050406030204" pitchFamily="18" charset="0"/>
                           </a:rPr>
-                          <m:t>Θ</m:t>
+                          <m:t>𝑜</m:t>
                         </m:r>
                       </m:e>
                     </m:d>
@@ -38735,190 +38670,10 @@
                       <a:rPr lang="en-US" altLang="ko-KR" b="0" i="1" smtClean="0">
                         <a:latin typeface="Cambria Math" panose="02040503050406030204" pitchFamily="18" charset="0"/>
                       </a:rPr>
-                      <m:t>=−</m:t>
+                      <m:t>=0.6972</m:t>
                     </m:r>
-                    <m:f>
-                      <m:fPr>
-                        <m:ctrlPr>
-                          <a:rPr lang="en-US" altLang="ko-KR" b="0" i="1" smtClean="0">
-                            <a:latin typeface="Cambria Math" panose="02040503050406030204" pitchFamily="18" charset="0"/>
-                          </a:rPr>
-                        </m:ctrlPr>
-                      </m:fPr>
-                      <m:num>
-                        <m:r>
-                          <a:rPr lang="en-US" altLang="ko-KR" b="0" i="1" smtClean="0">
-                            <a:latin typeface="Cambria Math" panose="02040503050406030204" pitchFamily="18" charset="0"/>
-                          </a:rPr>
-                          <m:t>1</m:t>
-                        </m:r>
-                      </m:num>
-                      <m:den>
-                        <m:r>
-                          <a:rPr lang="en-US" altLang="ko-KR" b="0" i="1" smtClean="0">
-                            <a:latin typeface="Cambria Math" panose="02040503050406030204" pitchFamily="18" charset="0"/>
-                          </a:rPr>
-                          <m:t>𝑛</m:t>
-                        </m:r>
-                      </m:den>
-                    </m:f>
-                    <m:nary>
-                      <m:naryPr>
-                        <m:chr m:val="∑"/>
-                        <m:ctrlPr>
-                          <a:rPr lang="en-US" altLang="ko-KR" b="0" i="1" smtClean="0">
-                            <a:latin typeface="Cambria Math" panose="02040503050406030204" pitchFamily="18" charset="0"/>
-                          </a:rPr>
-                        </m:ctrlPr>
-                      </m:naryPr>
-                      <m:sub>
-                        <m:r>
-                          <a:rPr lang="en-US" altLang="ko-KR" b="0" i="1" smtClean="0">
-                            <a:latin typeface="Cambria Math" panose="02040503050406030204" pitchFamily="18" charset="0"/>
-                          </a:rPr>
-                          <m:t>𝑖</m:t>
-                        </m:r>
-                        <m:r>
-                          <a:rPr lang="en-US" altLang="ko-KR" b="0" i="1" smtClean="0">
-                            <a:latin typeface="Cambria Math" panose="02040503050406030204" pitchFamily="18" charset="0"/>
-                          </a:rPr>
-                          <m:t>=1</m:t>
-                        </m:r>
-                      </m:sub>
-                      <m:sup>
-                        <m:r>
-                          <a:rPr lang="en-US" altLang="ko-KR" b="0" i="1" smtClean="0">
-                            <a:latin typeface="Cambria Math" panose="02040503050406030204" pitchFamily="18" charset="0"/>
-                          </a:rPr>
-                          <m:t>𝑛</m:t>
-                        </m:r>
-                      </m:sup>
-                      <m:e>
-                        <m:func>
-                          <m:funcPr>
-                            <m:ctrlPr>
-                              <a:rPr lang="en-US" altLang="ko-KR" b="0" i="1" smtClean="0">
-                                <a:latin typeface="Cambria Math" panose="02040503050406030204" pitchFamily="18" charset="0"/>
-                              </a:rPr>
-                            </m:ctrlPr>
-                          </m:funcPr>
-                          <m:fName>
-                            <m:r>
-                              <m:rPr>
-                                <m:sty m:val="p"/>
-                              </m:rPr>
-                              <a:rPr lang="en-US" altLang="ko-KR" b="0" i="0" smtClean="0">
-                                <a:latin typeface="Cambria Math" panose="02040503050406030204" pitchFamily="18" charset="0"/>
-                              </a:rPr>
-                              <m:t>log</m:t>
-                            </m:r>
-                          </m:fName>
-                          <m:e>
-                            <m:d>
-                              <m:dPr>
-                                <m:ctrlPr>
-                                  <a:rPr lang="en-US" altLang="ko-KR" b="0" i="1" smtClean="0">
-                                    <a:latin typeface="Cambria Math" panose="02040503050406030204" pitchFamily="18" charset="0"/>
-                                  </a:rPr>
-                                </m:ctrlPr>
-                              </m:dPr>
-                              <m:e>
-                                <m:r>
-                                  <a:rPr lang="en-US" altLang="ko-KR" b="0" i="1" smtClean="0">
-                                    <a:latin typeface="Cambria Math" panose="02040503050406030204" pitchFamily="18" charset="0"/>
-                                  </a:rPr>
-                                  <m:t>𝑠𝑜𝑓𝑡𝑚𝑎𝑥</m:t>
-                                </m:r>
-                                <m:r>
-                                  <a:rPr lang="en-US" altLang="ko-KR" b="0" i="1" smtClean="0">
-                                    <a:latin typeface="Cambria Math" panose="02040503050406030204" pitchFamily="18" charset="0"/>
-                                  </a:rPr>
-                                  <m:t>(</m:t>
-                                </m:r>
-                                <m:sSub>
-                                  <m:sSubPr>
-                                    <m:ctrlPr>
-                                      <a:rPr lang="en-US" altLang="ko-KR" b="0" i="1" smtClean="0">
-                                        <a:latin typeface="Cambria Math" panose="02040503050406030204" pitchFamily="18" charset="0"/>
-                                      </a:rPr>
-                                    </m:ctrlPr>
-                                  </m:sSubPr>
-                                  <m:e>
-                                    <m:r>
-                                      <a:rPr lang="en-US" altLang="ko-KR" b="0" i="1" smtClean="0">
-                                        <a:latin typeface="Cambria Math" panose="02040503050406030204" pitchFamily="18" charset="0"/>
-                                      </a:rPr>
-                                      <m:t>𝑜</m:t>
-                                    </m:r>
-                                  </m:e>
-                                  <m:sub>
-                                    <m:r>
-                                      <a:rPr lang="en-US" altLang="ko-KR" b="0" i="1" smtClean="0">
-                                        <a:latin typeface="Cambria Math" panose="02040503050406030204" pitchFamily="18" charset="0"/>
-                                      </a:rPr>
-                                      <m:t>𝑖</m:t>
-                                    </m:r>
-                                  </m:sub>
-                                </m:sSub>
-                                <m:d>
-                                  <m:dPr>
-                                    <m:begChr m:val="["/>
-                                    <m:endChr m:val="]"/>
-                                    <m:ctrlPr>
-                                      <a:rPr lang="en-US" altLang="ko-KR" b="0" i="1" smtClean="0">
-                                        <a:latin typeface="Cambria Math" panose="02040503050406030204" pitchFamily="18" charset="0"/>
-                                      </a:rPr>
-                                    </m:ctrlPr>
-                                  </m:dPr>
-                                  <m:e>
-                                    <m:sSub>
-                                      <m:sSubPr>
-                                        <m:ctrlPr>
-                                          <a:rPr lang="en-US" altLang="ko-KR" b="0" i="1" smtClean="0">
-                                            <a:latin typeface="Cambria Math" panose="02040503050406030204" pitchFamily="18" charset="0"/>
-                                          </a:rPr>
-                                        </m:ctrlPr>
-                                      </m:sSubPr>
-                                      <m:e>
-                                        <m:r>
-                                          <a:rPr lang="en-US" altLang="ko-KR" b="0" i="1" smtClean="0">
-                                            <a:latin typeface="Cambria Math" panose="02040503050406030204" pitchFamily="18" charset="0"/>
-                                          </a:rPr>
-                                          <m:t>𝑦</m:t>
-                                        </m:r>
-                                      </m:e>
-                                      <m:sub>
-                                        <m:r>
-                                          <a:rPr lang="en-US" altLang="ko-KR" b="0" i="1" smtClean="0">
-                                            <a:latin typeface="Cambria Math" panose="02040503050406030204" pitchFamily="18" charset="0"/>
-                                          </a:rPr>
-                                          <m:t>𝑖</m:t>
-                                        </m:r>
-                                      </m:sub>
-                                    </m:sSub>
-                                  </m:e>
-                                </m:d>
-                                <m:r>
-                                  <a:rPr lang="en-US" altLang="ko-KR" b="0" i="1" smtClean="0">
-                                    <a:latin typeface="Cambria Math" panose="02040503050406030204" pitchFamily="18" charset="0"/>
-                                  </a:rPr>
-                                  <m:t>)</m:t>
-                                </m:r>
-                              </m:e>
-                            </m:d>
-                          </m:e>
-                        </m:func>
-                      </m:e>
-                    </m:nary>
                   </m:oMath>
                 </a14:m>
-                <a:endParaRPr lang="ko-KR" altLang="en-US" dirty="0"/>
-              </a:p>
-              <a:p>
-                <a:r>
-                  <a:rPr lang="en-US" altLang="ko-KR" dirty="0" err="1"/>
-                  <a:t>Softmax</a:t>
-                </a:r>
                 <a:br>
                   <a:rPr lang="en-US" altLang="ko-KR" dirty="0"/>
                 </a:br>
@@ -38928,179 +38683,151 @@
                       <a:rPr lang="en-US" altLang="ko-KR" b="0" i="1" smtClean="0">
                         <a:latin typeface="Cambria Math" panose="02040503050406030204" pitchFamily="18" charset="0"/>
                       </a:rPr>
-                      <m:t>𝑠𝑜𝑓𝑡𝑚𝑎𝑥</m:t>
+                      <m:t>𝐵𝐶𝐸</m:t>
                     </m:r>
                     <m:r>
                       <a:rPr lang="en-US" altLang="ko-KR" b="0" i="1" smtClean="0">
                         <a:latin typeface="Cambria Math" panose="02040503050406030204" pitchFamily="18" charset="0"/>
                       </a:rPr>
-                      <m:t>(</m:t>
+                      <m:t>=−1×</m:t>
                     </m:r>
-                    <m:r>
-                      <a:rPr lang="en-US" altLang="ko-KR" b="0" i="1" smtClean="0">
-                        <a:latin typeface="Cambria Math" panose="02040503050406030204" pitchFamily="18" charset="0"/>
-                      </a:rPr>
-                      <m:t>𝑥</m:t>
-                    </m:r>
-                    <m:r>
-                      <a:rPr lang="en-US" altLang="ko-KR" b="0" i="1" smtClean="0">
-                        <a:latin typeface="Cambria Math" panose="02040503050406030204" pitchFamily="18" charset="0"/>
-                      </a:rPr>
-                      <m:t>[</m:t>
-                    </m:r>
-                    <m:r>
-                      <a:rPr lang="en-US" altLang="ko-KR" b="0" i="1" smtClean="0">
-                        <a:latin typeface="Cambria Math" panose="02040503050406030204" pitchFamily="18" charset="0"/>
-                      </a:rPr>
-                      <m:t>𝑖</m:t>
-                    </m:r>
-                    <m:r>
-                      <a:rPr lang="en-US" altLang="ko-KR" b="0" i="1" smtClean="0">
-                        <a:latin typeface="Cambria Math" panose="02040503050406030204" pitchFamily="18" charset="0"/>
-                      </a:rPr>
-                      <m:t>])=</m:t>
-                    </m:r>
-                    <m:f>
-                      <m:fPr>
+                    <m:func>
+                      <m:funcPr>
                         <m:ctrlPr>
                           <a:rPr lang="en-US" altLang="ko-KR" b="0" i="1" smtClean="0">
                             <a:latin typeface="Cambria Math" panose="02040503050406030204" pitchFamily="18" charset="0"/>
                           </a:rPr>
                         </m:ctrlPr>
-                      </m:fPr>
-                      <m:num>
-                        <m:sSup>
-                          <m:sSupPr>
+                      </m:funcPr>
+                      <m:fName>
+                        <m:r>
+                          <m:rPr>
+                            <m:sty m:val="p"/>
+                          </m:rPr>
+                          <a:rPr lang="en-US" altLang="ko-KR" b="0" i="0" smtClean="0">
+                            <a:latin typeface="Cambria Math" panose="02040503050406030204" pitchFamily="18" charset="0"/>
+                          </a:rPr>
+                          <m:t>log</m:t>
+                        </m:r>
+                      </m:fName>
+                      <m:e>
+                        <m:r>
+                          <a:rPr lang="en-US" altLang="ko-KR" b="0" i="1" smtClean="0">
+                            <a:latin typeface="Cambria Math" panose="02040503050406030204" pitchFamily="18" charset="0"/>
+                          </a:rPr>
+                          <m:t>0.6972</m:t>
+                        </m:r>
+                      </m:e>
+                    </m:func>
+                    <m:r>
+                      <a:rPr lang="en-US" altLang="ko-KR" b="0" i="1" smtClean="0">
+                        <a:latin typeface="Cambria Math" panose="02040503050406030204" pitchFamily="18" charset="0"/>
+                      </a:rPr>
+                      <m:t>−0</m:t>
+                    </m:r>
+                    <m:r>
+                      <a:rPr lang="en-US" altLang="ko-KR" b="0" i="1" smtClean="0">
+                        <a:latin typeface="Cambria Math" panose="02040503050406030204" pitchFamily="18" charset="0"/>
+                        <a:ea typeface="Cambria Math" panose="02040503050406030204" pitchFamily="18" charset="0"/>
+                      </a:rPr>
+                      <m:t>×</m:t>
+                    </m:r>
+                    <m:func>
+                      <m:funcPr>
+                        <m:ctrlPr>
+                          <a:rPr lang="en-US" altLang="ko-KR" b="0" i="1" smtClean="0">
+                            <a:latin typeface="Cambria Math" panose="02040503050406030204" pitchFamily="18" charset="0"/>
+                            <a:ea typeface="Cambria Math" panose="02040503050406030204" pitchFamily="18" charset="0"/>
+                          </a:rPr>
+                        </m:ctrlPr>
+                      </m:funcPr>
+                      <m:fName>
+                        <m:r>
+                          <m:rPr>
+                            <m:sty m:val="p"/>
+                          </m:rPr>
+                          <a:rPr lang="en-US" altLang="ko-KR" b="0" i="0" smtClean="0">
+                            <a:latin typeface="Cambria Math" panose="02040503050406030204" pitchFamily="18" charset="0"/>
+                            <a:ea typeface="Cambria Math" panose="02040503050406030204" pitchFamily="18" charset="0"/>
+                          </a:rPr>
+                          <m:t>log</m:t>
+                        </m:r>
+                      </m:fName>
+                      <m:e>
+                        <m:d>
+                          <m:dPr>
                             <m:ctrlPr>
                               <a:rPr lang="en-US" altLang="ko-KR" b="0" i="1" smtClean="0">
                                 <a:latin typeface="Cambria Math" panose="02040503050406030204" pitchFamily="18" charset="0"/>
+                                <a:ea typeface="Cambria Math" panose="02040503050406030204" pitchFamily="18" charset="0"/>
                               </a:rPr>
                             </m:ctrlPr>
-                          </m:sSupPr>
+                          </m:dPr>
                           <m:e>
                             <m:r>
                               <a:rPr lang="en-US" altLang="ko-KR" b="0" i="1" smtClean="0">
                                 <a:latin typeface="Cambria Math" panose="02040503050406030204" pitchFamily="18" charset="0"/>
+                                <a:ea typeface="Cambria Math" panose="02040503050406030204" pitchFamily="18" charset="0"/>
                               </a:rPr>
-                              <m:t>𝑒</m:t>
+                              <m:t>1−0.6972</m:t>
                             </m:r>
                           </m:e>
-                          <m:sup>
-                            <m:r>
-                              <a:rPr lang="en-US" altLang="ko-KR" b="0" i="1" smtClean="0">
-                                <a:latin typeface="Cambria Math" panose="02040503050406030204" pitchFamily="18" charset="0"/>
-                              </a:rPr>
-                              <m:t>𝑥</m:t>
-                            </m:r>
-                            <m:r>
-                              <a:rPr lang="en-US" altLang="ko-KR" b="0" i="1" smtClean="0">
-                                <a:latin typeface="Cambria Math" panose="02040503050406030204" pitchFamily="18" charset="0"/>
-                              </a:rPr>
-                              <m:t>[</m:t>
-                            </m:r>
-                            <m:r>
-                              <a:rPr lang="en-US" altLang="ko-KR" b="0" i="1" smtClean="0">
-                                <a:latin typeface="Cambria Math" panose="02040503050406030204" pitchFamily="18" charset="0"/>
-                              </a:rPr>
-                              <m:t>𝑖</m:t>
-                            </m:r>
-                            <m:r>
-                              <a:rPr lang="en-US" altLang="ko-KR" b="0" i="1" smtClean="0">
-                                <a:latin typeface="Cambria Math" panose="02040503050406030204" pitchFamily="18" charset="0"/>
-                              </a:rPr>
-                              <m:t>]</m:t>
-                            </m:r>
-                          </m:sup>
-                        </m:sSup>
-                      </m:num>
-                      <m:den>
-                        <m:nary>
-                          <m:naryPr>
-                            <m:chr m:val="∑"/>
-                            <m:ctrlPr>
-                              <a:rPr lang="en-US" altLang="ko-KR" b="0" i="1" smtClean="0">
-                                <a:latin typeface="Cambria Math" panose="02040503050406030204" pitchFamily="18" charset="0"/>
-                              </a:rPr>
-                            </m:ctrlPr>
-                          </m:naryPr>
-                          <m:sub>
-                            <m:r>
-                              <a:rPr lang="en-US" altLang="ko-KR" b="0" i="1" smtClean="0">
-                                <a:latin typeface="Cambria Math" panose="02040503050406030204" pitchFamily="18" charset="0"/>
-                              </a:rPr>
-                              <m:t>𝑗</m:t>
-                            </m:r>
-                          </m:sub>
-                          <m:sup>
-                            <m:r>
-                              <a:rPr lang="en-US" altLang="ko-KR" b="0" i="1" smtClean="0">
-                                <a:latin typeface="Cambria Math" panose="02040503050406030204" pitchFamily="18" charset="0"/>
-                              </a:rPr>
-                              <m:t>𝑘</m:t>
-                            </m:r>
-                          </m:sup>
-                          <m:e>
-                            <m:sSup>
-                              <m:sSupPr>
-                                <m:ctrlPr>
-                                  <a:rPr lang="en-US" altLang="ko-KR" b="0" i="1" smtClean="0">
-                                    <a:latin typeface="Cambria Math" panose="02040503050406030204" pitchFamily="18" charset="0"/>
-                                  </a:rPr>
-                                </m:ctrlPr>
-                              </m:sSupPr>
-                              <m:e>
-                                <m:r>
-                                  <a:rPr lang="en-US" altLang="ko-KR" b="0" i="1" smtClean="0">
-                                    <a:latin typeface="Cambria Math" panose="02040503050406030204" pitchFamily="18" charset="0"/>
-                                  </a:rPr>
-                                  <m:t>𝑒</m:t>
-                                </m:r>
-                              </m:e>
-                              <m:sup>
-                                <m:r>
-                                  <a:rPr lang="en-US" altLang="ko-KR" b="0" i="1" smtClean="0">
-                                    <a:latin typeface="Cambria Math" panose="02040503050406030204" pitchFamily="18" charset="0"/>
-                                  </a:rPr>
-                                  <m:t>𝑥</m:t>
-                                </m:r>
-                                <m:r>
-                                  <a:rPr lang="en-US" altLang="ko-KR" b="0" i="1" smtClean="0">
-                                    <a:latin typeface="Cambria Math" panose="02040503050406030204" pitchFamily="18" charset="0"/>
-                                  </a:rPr>
-                                  <m:t>[</m:t>
-                                </m:r>
-                                <m:r>
-                                  <a:rPr lang="en-US" altLang="ko-KR" b="0" i="1" smtClean="0">
-                                    <a:latin typeface="Cambria Math" panose="02040503050406030204" pitchFamily="18" charset="0"/>
-                                  </a:rPr>
-                                  <m:t>𝑗</m:t>
-                                </m:r>
-                                <m:r>
-                                  <a:rPr lang="en-US" altLang="ko-KR" b="0" i="1" smtClean="0">
-                                    <a:latin typeface="Cambria Math" panose="02040503050406030204" pitchFamily="18" charset="0"/>
-                                  </a:rPr>
-                                  <m:t>]</m:t>
-                                </m:r>
-                              </m:sup>
-                            </m:sSup>
-                          </m:e>
-                        </m:nary>
-                      </m:den>
-                    </m:f>
+                        </m:d>
+                      </m:e>
+                    </m:func>
                   </m:oMath>
                 </a14:m>
-                <a:endParaRPr lang="ko-KR" altLang="en-US" dirty="0"/>
+                <a:br>
+                  <a:rPr lang="en-US" altLang="ko-KR" b="0" dirty="0">
+                    <a:ea typeface="Cambria Math" panose="02040503050406030204" pitchFamily="18" charset="0"/>
+                  </a:rPr>
+                </a:br>
+                <a14:m>
+                  <m:oMath xmlns:m="http://schemas.openxmlformats.org/officeDocument/2006/math">
+                    <m:r>
+                      <a:rPr lang="en-US" altLang="ko-KR" b="0" i="1" smtClean="0">
+                        <a:latin typeface="Cambria Math" panose="02040503050406030204" pitchFamily="18" charset="0"/>
+                        <a:ea typeface="Cambria Math" panose="02040503050406030204" pitchFamily="18" charset="0"/>
+                      </a:rPr>
+                      <m:t>=0.3606</m:t>
+                    </m:r>
+                  </m:oMath>
+                </a14:m>
+                <a:endParaRPr lang="en-US" altLang="ko-KR" dirty="0"/>
+              </a:p>
+              <a:p>
+                <a:r>
+                  <a:rPr lang="ko-KR" altLang="en-US" dirty="0"/>
+                  <a:t>만약 실제 값이 </a:t>
+                </a:r>
+                <a:r>
+                  <a:rPr lang="en-US" altLang="ko-KR" dirty="0"/>
+                  <a:t>0</a:t>
+                </a:r>
+                <a:r>
+                  <a:rPr lang="ko-KR" altLang="en-US" dirty="0"/>
+                  <a:t>이라면</a:t>
+                </a:r>
+                <a:r>
+                  <a:rPr lang="en-US" altLang="ko-KR" dirty="0"/>
+                  <a:t>, 1.1946</a:t>
+                </a:r>
+                <a:r>
+                  <a:rPr lang="ko-KR" altLang="en-US" dirty="0"/>
+                  <a:t>이 출력</a:t>
+                </a:r>
+                <a:endParaRPr lang="en-US" altLang="ko-KR" dirty="0"/>
               </a:p>
             </p:txBody>
           </p:sp>
         </mc:Choice>
-        <mc:Fallback xmlns="">
+        <mc:Fallback>
           <p:sp>
             <p:nvSpPr>
               <p:cNvPr id="3" name="내용 개체 틀 2">
                 <a:extLst>
                   <a:ext uri="{FF2B5EF4-FFF2-40B4-BE49-F238E27FC236}">
-                    <a16:creationId xmlns:a16="http://schemas.microsoft.com/office/drawing/2014/main" id="{EABA7002-F9E4-4335-90C3-263538207351}"/>
+                    <a16:creationId xmlns:a16="http://schemas.microsoft.com/office/drawing/2014/main" id="{13E156F2-B457-47E5-8103-FBA70AC58F60}"/>
                   </a:ext>
                 </a:extLst>
               </p:cNvPr>
@@ -39134,122 +38861,10 @@
           </p:sp>
         </mc:Fallback>
       </mc:AlternateContent>
-      <mc:AlternateContent xmlns:mc="http://schemas.openxmlformats.org/markup-compatibility/2006" xmlns:a14="http://schemas.microsoft.com/office/drawing/2010/main">
-        <mc:Choice Requires="a14">
-          <p:sp>
-            <p:nvSpPr>
-              <p:cNvPr id="4" name="TextBox 3">
-                <a:extLst>
-                  <a:ext uri="{FF2B5EF4-FFF2-40B4-BE49-F238E27FC236}">
-                    <a16:creationId xmlns:a16="http://schemas.microsoft.com/office/drawing/2014/main" id="{BDF8CFD8-A323-4A49-BCB6-A7B4FAB04FFC}"/>
-                  </a:ext>
-                </a:extLst>
-              </p:cNvPr>
-              <p:cNvSpPr txBox="1"/>
-              <p:nvPr/>
-            </p:nvSpPr>
-            <p:spPr>
-              <a:xfrm>
-                <a:off x="8773118" y="2941444"/>
-                <a:ext cx="2399252" cy="646331"/>
-              </a:xfrm>
-              <a:prstGeom prst="rect">
-                <a:avLst/>
-              </a:prstGeom>
-              <a:noFill/>
-            </p:spPr>
-            <p:txBody>
-              <a:bodyPr wrap="square" rtlCol="0">
-                <a:spAutoFit/>
-              </a:bodyPr>
-              <a:lstStyle/>
-              <a:p>
-                <a14:m>
-                  <m:oMath xmlns:m="http://schemas.openxmlformats.org/officeDocument/2006/math">
-                    <m:sSub>
-                      <m:sSubPr>
-                        <m:ctrlPr>
-                          <a:rPr lang="en-US" altLang="ko-KR" b="0" i="1" smtClean="0">
-                            <a:latin typeface="Cambria Math" panose="02040503050406030204" pitchFamily="18" charset="0"/>
-                          </a:rPr>
-                        </m:ctrlPr>
-                      </m:sSubPr>
-                      <m:e>
-                        <m:r>
-                          <a:rPr lang="en-US" altLang="ko-KR" b="0" i="1" smtClean="0">
-                            <a:latin typeface="Cambria Math" panose="02040503050406030204" pitchFamily="18" charset="0"/>
-                          </a:rPr>
-                          <m:t>𝑦</m:t>
-                        </m:r>
-                      </m:e>
-                      <m:sub>
-                        <m:r>
-                          <a:rPr lang="en-US" altLang="ko-KR" b="0" i="1" smtClean="0">
-                            <a:latin typeface="Cambria Math" panose="02040503050406030204" pitchFamily="18" charset="0"/>
-                          </a:rPr>
-                          <m:t>𝑖</m:t>
-                        </m:r>
-                      </m:sub>
-                    </m:sSub>
-                  </m:oMath>
-                </a14:m>
-                <a:r>
-                  <a:rPr lang="ko-KR" altLang="en-US" dirty="0"/>
-                  <a:t>는 정답 클래스의 인덱스를 나타냄</a:t>
-                </a:r>
-              </a:p>
-            </p:txBody>
-          </p:sp>
-        </mc:Choice>
-        <mc:Fallback xmlns="">
-          <p:sp>
-            <p:nvSpPr>
-              <p:cNvPr id="4" name="TextBox 3">
-                <a:extLst>
-                  <a:ext uri="{FF2B5EF4-FFF2-40B4-BE49-F238E27FC236}">
-                    <a16:creationId xmlns:a16="http://schemas.microsoft.com/office/drawing/2014/main" id="{BDF8CFD8-A323-4A49-BCB6-A7B4FAB04FFC}"/>
-                  </a:ext>
-                </a:extLst>
-              </p:cNvPr>
-              <p:cNvSpPr txBox="1">
-                <a:spLocks noRot="1" noChangeAspect="1" noMove="1" noResize="1" noEditPoints="1" noAdjustHandles="1" noChangeArrowheads="1" noChangeShapeType="1" noTextEdit="1"/>
-              </p:cNvSpPr>
-              <p:nvPr/>
-            </p:nvSpPr>
-            <p:spPr>
-              <a:xfrm>
-                <a:off x="8773118" y="2941444"/>
-                <a:ext cx="2399252" cy="646331"/>
-              </a:xfrm>
-              <a:prstGeom prst="rect">
-                <a:avLst/>
-              </a:prstGeom>
-              <a:blipFill>
-                <a:blip r:embed="rId3"/>
-                <a:stretch>
-                  <a:fillRect l="-2030" t="-5660" b="-14151"/>
-                </a:stretch>
-              </a:blipFill>
-            </p:spPr>
-            <p:txBody>
-              <a:bodyPr/>
-              <a:lstStyle/>
-              <a:p>
-                <a:r>
-                  <a:rPr lang="ko-KR" altLang="en-US">
-                    <a:noFill/>
-                  </a:rPr>
-                  <a:t> </a:t>
-                </a:r>
-              </a:p>
-            </p:txBody>
-          </p:sp>
-        </mc:Fallback>
-      </mc:AlternateContent>
     </p:spTree>
     <p:extLst>
       <p:ext uri="{BB962C8B-B14F-4D97-AF65-F5344CB8AC3E}">
-        <p14:creationId xmlns:p14="http://schemas.microsoft.com/office/powerpoint/2010/main" val="965909426"/>
+        <p14:creationId xmlns:p14="http://schemas.microsoft.com/office/powerpoint/2010/main" val="3686340026"/>
       </p:ext>
     </p:extLst>
   </p:cSld>
@@ -39538,6 +39153,1459 @@
           <p:cNvPr id="2" name="제목 1">
             <a:extLst>
               <a:ext uri="{FF2B5EF4-FFF2-40B4-BE49-F238E27FC236}">
+                <a16:creationId xmlns:a16="http://schemas.microsoft.com/office/drawing/2014/main" id="{7ECB54A6-FA4F-4BA7-A012-260F31DF9334}"/>
+              </a:ext>
+            </a:extLst>
+          </p:cNvPr>
+          <p:cNvSpPr>
+            <a:spLocks noGrp="1"/>
+          </p:cNvSpPr>
+          <p:nvPr>
+            <p:ph type="title"/>
+          </p:nvPr>
+        </p:nvSpPr>
+        <p:spPr/>
+        <p:txBody>
+          <a:bodyPr/>
+          <a:lstStyle/>
+          <a:p>
+            <a:r>
+              <a:rPr lang="ko-KR" altLang="en-US" dirty="0"/>
+              <a:t>여러 손실 함수</a:t>
+            </a:r>
+          </a:p>
+        </p:txBody>
+      </p:sp>
+      <mc:AlternateContent xmlns:mc="http://schemas.openxmlformats.org/markup-compatibility/2006">
+        <mc:Choice xmlns:a14="http://schemas.microsoft.com/office/drawing/2010/main" Requires="a14">
+          <p:sp>
+            <p:nvSpPr>
+              <p:cNvPr id="3" name="내용 개체 틀 2">
+                <a:extLst>
+                  <a:ext uri="{FF2B5EF4-FFF2-40B4-BE49-F238E27FC236}">
+                    <a16:creationId xmlns:a16="http://schemas.microsoft.com/office/drawing/2014/main" id="{EABA7002-F9E4-4335-90C3-263538207351}"/>
+                  </a:ext>
+                </a:extLst>
+              </p:cNvPr>
+              <p:cNvSpPr>
+                <a:spLocks noGrp="1"/>
+              </p:cNvSpPr>
+              <p:nvPr>
+                <p:ph idx="1"/>
+              </p:nvPr>
+            </p:nvSpPr>
+            <p:spPr/>
+            <p:txBody>
+              <a:bodyPr/>
+              <a:lstStyle/>
+              <a:p>
+                <a:r>
+                  <a:rPr lang="en-US" altLang="ko-KR" dirty="0"/>
+                  <a:t>Cross Entropy(</a:t>
+                </a:r>
+                <a:r>
+                  <a:rPr lang="en-US" altLang="ko-KR"/>
+                  <a:t>CE)</a:t>
+                </a:r>
+                <a:br>
+                  <a:rPr lang="en-US" altLang="ko-KR" dirty="0"/>
+                </a:br>
+                <a14:m>
+                  <m:oMath xmlns:m="http://schemas.openxmlformats.org/officeDocument/2006/math">
+                    <m:r>
+                      <a:rPr lang="en-US" altLang="ko-KR" b="0" i="1" smtClean="0">
+                        <a:latin typeface="Cambria Math" panose="02040503050406030204" pitchFamily="18" charset="0"/>
+                      </a:rPr>
+                      <m:t>𝐽</m:t>
+                    </m:r>
+                    <m:d>
+                      <m:dPr>
+                        <m:ctrlPr>
+                          <a:rPr lang="en-US" altLang="ko-KR" b="0" i="1" smtClean="0">
+                            <a:latin typeface="Cambria Math" panose="02040503050406030204" pitchFamily="18" charset="0"/>
+                          </a:rPr>
+                        </m:ctrlPr>
+                      </m:dPr>
+                      <m:e>
+                        <m:r>
+                          <m:rPr>
+                            <m:sty m:val="p"/>
+                          </m:rPr>
+                          <a:rPr lang="en-US" altLang="ko-KR" b="0" i="0" smtClean="0">
+                            <a:latin typeface="Cambria Math" panose="02040503050406030204" pitchFamily="18" charset="0"/>
+                          </a:rPr>
+                          <m:t>Θ</m:t>
+                        </m:r>
+                      </m:e>
+                    </m:d>
+                    <m:r>
+                      <a:rPr lang="en-US" altLang="ko-KR" b="0" i="1" smtClean="0">
+                        <a:latin typeface="Cambria Math" panose="02040503050406030204" pitchFamily="18" charset="0"/>
+                      </a:rPr>
+                      <m:t>=−</m:t>
+                    </m:r>
+                    <m:nary>
+                      <m:naryPr>
+                        <m:chr m:val="∑"/>
+                        <m:ctrlPr>
+                          <a:rPr lang="en-US" altLang="ko-KR" b="0" i="1" smtClean="0">
+                            <a:latin typeface="Cambria Math" panose="02040503050406030204" pitchFamily="18" charset="0"/>
+                          </a:rPr>
+                        </m:ctrlPr>
+                      </m:naryPr>
+                      <m:sub>
+                        <m:r>
+                          <a:rPr lang="en-US" altLang="ko-KR" b="0" i="1" smtClean="0">
+                            <a:latin typeface="Cambria Math" panose="02040503050406030204" pitchFamily="18" charset="0"/>
+                          </a:rPr>
+                          <m:t>𝑖</m:t>
+                        </m:r>
+                        <m:r>
+                          <a:rPr lang="en-US" altLang="ko-KR" b="0" i="1" smtClean="0">
+                            <a:latin typeface="Cambria Math" panose="02040503050406030204" pitchFamily="18" charset="0"/>
+                          </a:rPr>
+                          <m:t>=1</m:t>
+                        </m:r>
+                      </m:sub>
+                      <m:sup>
+                        <m:r>
+                          <a:rPr lang="en-US" altLang="ko-KR" b="0" i="1" smtClean="0">
+                            <a:latin typeface="Cambria Math" panose="02040503050406030204" pitchFamily="18" charset="0"/>
+                          </a:rPr>
+                          <m:t>𝑛</m:t>
+                        </m:r>
+                      </m:sup>
+                      <m:e>
+                        <m:sSub>
+                          <m:sSubPr>
+                            <m:ctrlPr>
+                              <a:rPr lang="en-US" altLang="ko-KR" b="0" i="1" smtClean="0">
+                                <a:latin typeface="Cambria Math" panose="02040503050406030204" pitchFamily="18" charset="0"/>
+                              </a:rPr>
+                            </m:ctrlPr>
+                          </m:sSubPr>
+                          <m:e>
+                            <m:r>
+                              <a:rPr lang="en-US" altLang="ko-KR" b="0" i="1" smtClean="0">
+                                <a:latin typeface="Cambria Math" panose="02040503050406030204" pitchFamily="18" charset="0"/>
+                              </a:rPr>
+                              <m:t>𝑦</m:t>
+                            </m:r>
+                          </m:e>
+                          <m:sub>
+                            <m:r>
+                              <a:rPr lang="en-US" altLang="ko-KR" b="0" i="1" smtClean="0">
+                                <a:latin typeface="Cambria Math" panose="02040503050406030204" pitchFamily="18" charset="0"/>
+                              </a:rPr>
+                              <m:t>𝑖</m:t>
+                            </m:r>
+                          </m:sub>
+                        </m:sSub>
+                        <m:func>
+                          <m:funcPr>
+                            <m:ctrlPr>
+                              <a:rPr lang="en-US" altLang="ko-KR" b="0" i="1" smtClean="0">
+                                <a:latin typeface="Cambria Math" panose="02040503050406030204" pitchFamily="18" charset="0"/>
+                              </a:rPr>
+                            </m:ctrlPr>
+                          </m:funcPr>
+                          <m:fName>
+                            <m:r>
+                              <m:rPr>
+                                <m:sty m:val="p"/>
+                              </m:rPr>
+                              <a:rPr lang="en-US" altLang="ko-KR" b="0" i="0" smtClean="0">
+                                <a:latin typeface="Cambria Math" panose="02040503050406030204" pitchFamily="18" charset="0"/>
+                              </a:rPr>
+                              <m:t>log</m:t>
+                            </m:r>
+                          </m:fName>
+                          <m:e>
+                            <m:d>
+                              <m:dPr>
+                                <m:ctrlPr>
+                                  <a:rPr lang="en-US" altLang="ko-KR" b="0" i="1" smtClean="0">
+                                    <a:latin typeface="Cambria Math" panose="02040503050406030204" pitchFamily="18" charset="0"/>
+                                  </a:rPr>
+                                </m:ctrlPr>
+                              </m:dPr>
+                              <m:e>
+                                <m:r>
+                                  <a:rPr lang="en-US" altLang="ko-KR" b="0" i="1" smtClean="0">
+                                    <a:latin typeface="Cambria Math" panose="02040503050406030204" pitchFamily="18" charset="0"/>
+                                  </a:rPr>
+                                  <m:t>𝑠𝑜𝑓𝑡𝑚𝑎𝑥</m:t>
+                                </m:r>
+                                <m:r>
+                                  <a:rPr lang="en-US" altLang="ko-KR" b="0" i="1" smtClean="0">
+                                    <a:latin typeface="Cambria Math" panose="02040503050406030204" pitchFamily="18" charset="0"/>
+                                  </a:rPr>
+                                  <m:t>(</m:t>
+                                </m:r>
+                                <m:sSub>
+                                  <m:sSubPr>
+                                    <m:ctrlPr>
+                                      <a:rPr lang="en-US" altLang="ko-KR" b="0" i="1" smtClean="0">
+                                        <a:latin typeface="Cambria Math" panose="02040503050406030204" pitchFamily="18" charset="0"/>
+                                      </a:rPr>
+                                    </m:ctrlPr>
+                                  </m:sSubPr>
+                                  <m:e>
+                                    <m:r>
+                                      <a:rPr lang="en-US" altLang="ko-KR" b="0" i="1" smtClean="0">
+                                        <a:latin typeface="Cambria Math" panose="02040503050406030204" pitchFamily="18" charset="0"/>
+                                      </a:rPr>
+                                      <m:t>𝑜</m:t>
+                                    </m:r>
+                                  </m:e>
+                                  <m:sub>
+                                    <m:r>
+                                      <a:rPr lang="en-US" altLang="ko-KR" b="0" i="1" smtClean="0">
+                                        <a:latin typeface="Cambria Math" panose="02040503050406030204" pitchFamily="18" charset="0"/>
+                                      </a:rPr>
+                                      <m:t>𝑖</m:t>
+                                    </m:r>
+                                  </m:sub>
+                                </m:sSub>
+                                <m:r>
+                                  <a:rPr lang="en-US" altLang="ko-KR" b="0" i="1" smtClean="0">
+                                    <a:latin typeface="Cambria Math" panose="02040503050406030204" pitchFamily="18" charset="0"/>
+                                  </a:rPr>
+                                  <m:t>)</m:t>
+                                </m:r>
+                              </m:e>
+                            </m:d>
+                          </m:e>
+                        </m:func>
+                      </m:e>
+                    </m:nary>
+                  </m:oMath>
+                </a14:m>
+                <a:endParaRPr lang="ko-KR" altLang="en-US" dirty="0"/>
+              </a:p>
+              <a:p>
+                <a:r>
+                  <a:rPr lang="en-US" altLang="ko-KR" dirty="0" err="1"/>
+                  <a:t>Softmax</a:t>
+                </a:r>
+                <a:br>
+                  <a:rPr lang="en-US" altLang="ko-KR" dirty="0"/>
+                </a:br>
+                <a14:m>
+                  <m:oMath xmlns:m="http://schemas.openxmlformats.org/officeDocument/2006/math">
+                    <m:r>
+                      <a:rPr lang="en-US" altLang="ko-KR" b="0" i="1" smtClean="0">
+                        <a:latin typeface="Cambria Math" panose="02040503050406030204" pitchFamily="18" charset="0"/>
+                      </a:rPr>
+                      <m:t>𝑠𝑜𝑓𝑡𝑚𝑎𝑥</m:t>
+                    </m:r>
+                    <m:r>
+                      <a:rPr lang="en-US" altLang="ko-KR" b="0" i="1" smtClean="0">
+                        <a:latin typeface="Cambria Math" panose="02040503050406030204" pitchFamily="18" charset="0"/>
+                      </a:rPr>
+                      <m:t>(</m:t>
+                    </m:r>
+                    <m:sSub>
+                      <m:sSubPr>
+                        <m:ctrlPr>
+                          <a:rPr lang="en-US" altLang="ko-KR" b="0" i="1" smtClean="0">
+                            <a:latin typeface="Cambria Math" panose="02040503050406030204" pitchFamily="18" charset="0"/>
+                          </a:rPr>
+                        </m:ctrlPr>
+                      </m:sSubPr>
+                      <m:e>
+                        <m:r>
+                          <a:rPr lang="en-US" altLang="ko-KR" b="0" i="1" smtClean="0">
+                            <a:latin typeface="Cambria Math" panose="02040503050406030204" pitchFamily="18" charset="0"/>
+                          </a:rPr>
+                          <m:t>𝑜</m:t>
+                        </m:r>
+                      </m:e>
+                      <m:sub>
+                        <m:r>
+                          <a:rPr lang="en-US" altLang="ko-KR" b="0" i="1" smtClean="0">
+                            <a:latin typeface="Cambria Math" panose="02040503050406030204" pitchFamily="18" charset="0"/>
+                          </a:rPr>
+                          <m:t>𝑖</m:t>
+                        </m:r>
+                      </m:sub>
+                    </m:sSub>
+                    <m:r>
+                      <a:rPr lang="en-US" altLang="ko-KR" b="0" i="1" smtClean="0">
+                        <a:latin typeface="Cambria Math" panose="02040503050406030204" pitchFamily="18" charset="0"/>
+                      </a:rPr>
+                      <m:t>)=</m:t>
+                    </m:r>
+                    <m:f>
+                      <m:fPr>
+                        <m:ctrlPr>
+                          <a:rPr lang="en-US" altLang="ko-KR" b="0" i="1" smtClean="0">
+                            <a:latin typeface="Cambria Math" panose="02040503050406030204" pitchFamily="18" charset="0"/>
+                          </a:rPr>
+                        </m:ctrlPr>
+                      </m:fPr>
+                      <m:num>
+                        <m:sSup>
+                          <m:sSupPr>
+                            <m:ctrlPr>
+                              <a:rPr lang="en-US" altLang="ko-KR" b="0" i="1" smtClean="0">
+                                <a:latin typeface="Cambria Math" panose="02040503050406030204" pitchFamily="18" charset="0"/>
+                              </a:rPr>
+                            </m:ctrlPr>
+                          </m:sSupPr>
+                          <m:e>
+                            <m:r>
+                              <a:rPr lang="en-US" altLang="ko-KR" b="0" i="1" smtClean="0">
+                                <a:latin typeface="Cambria Math" panose="02040503050406030204" pitchFamily="18" charset="0"/>
+                              </a:rPr>
+                              <m:t>𝑒</m:t>
+                            </m:r>
+                          </m:e>
+                          <m:sup>
+                            <m:sSub>
+                              <m:sSubPr>
+                                <m:ctrlPr>
+                                  <a:rPr lang="en-US" altLang="ko-KR" b="0" i="1" smtClean="0">
+                                    <a:latin typeface="Cambria Math" panose="02040503050406030204" pitchFamily="18" charset="0"/>
+                                  </a:rPr>
+                                </m:ctrlPr>
+                              </m:sSubPr>
+                              <m:e>
+                                <m:r>
+                                  <a:rPr lang="en-US" altLang="ko-KR" b="0" i="1" smtClean="0">
+                                    <a:latin typeface="Cambria Math" panose="02040503050406030204" pitchFamily="18" charset="0"/>
+                                  </a:rPr>
+                                  <m:t>𝑜</m:t>
+                                </m:r>
+                              </m:e>
+                              <m:sub>
+                                <m:r>
+                                  <a:rPr lang="en-US" altLang="ko-KR" b="0" i="1" smtClean="0">
+                                    <a:latin typeface="Cambria Math" panose="02040503050406030204" pitchFamily="18" charset="0"/>
+                                  </a:rPr>
+                                  <m:t>𝑖</m:t>
+                                </m:r>
+                              </m:sub>
+                            </m:sSub>
+                          </m:sup>
+                        </m:sSup>
+                      </m:num>
+                      <m:den>
+                        <m:nary>
+                          <m:naryPr>
+                            <m:chr m:val="∑"/>
+                            <m:ctrlPr>
+                              <a:rPr lang="en-US" altLang="ko-KR" b="0" i="1" smtClean="0">
+                                <a:latin typeface="Cambria Math" panose="02040503050406030204" pitchFamily="18" charset="0"/>
+                              </a:rPr>
+                            </m:ctrlPr>
+                          </m:naryPr>
+                          <m:sub>
+                            <m:r>
+                              <a:rPr lang="en-US" altLang="ko-KR" b="0" i="1" smtClean="0">
+                                <a:latin typeface="Cambria Math" panose="02040503050406030204" pitchFamily="18" charset="0"/>
+                              </a:rPr>
+                              <m:t>𝑗</m:t>
+                            </m:r>
+                          </m:sub>
+                          <m:sup>
+                            <m:r>
+                              <a:rPr lang="en-US" altLang="ko-KR" b="0" i="1" smtClean="0">
+                                <a:latin typeface="Cambria Math" panose="02040503050406030204" pitchFamily="18" charset="0"/>
+                              </a:rPr>
+                              <m:t>𝑛</m:t>
+                            </m:r>
+                          </m:sup>
+                          <m:e>
+                            <m:sSup>
+                              <m:sSupPr>
+                                <m:ctrlPr>
+                                  <a:rPr lang="en-US" altLang="ko-KR" b="0" i="1" smtClean="0">
+                                    <a:latin typeface="Cambria Math" panose="02040503050406030204" pitchFamily="18" charset="0"/>
+                                  </a:rPr>
+                                </m:ctrlPr>
+                              </m:sSupPr>
+                              <m:e>
+                                <m:r>
+                                  <a:rPr lang="en-US" altLang="ko-KR" b="0" i="1" smtClean="0">
+                                    <a:latin typeface="Cambria Math" panose="02040503050406030204" pitchFamily="18" charset="0"/>
+                                  </a:rPr>
+                                  <m:t>𝑒</m:t>
+                                </m:r>
+                              </m:e>
+                              <m:sup>
+                                <m:sSub>
+                                  <m:sSubPr>
+                                    <m:ctrlPr>
+                                      <a:rPr lang="en-US" altLang="ko-KR" b="0" i="1" smtClean="0">
+                                        <a:latin typeface="Cambria Math" panose="02040503050406030204" pitchFamily="18" charset="0"/>
+                                      </a:rPr>
+                                    </m:ctrlPr>
+                                  </m:sSubPr>
+                                  <m:e>
+                                    <m:r>
+                                      <a:rPr lang="en-US" altLang="ko-KR" b="0" i="1" smtClean="0">
+                                        <a:latin typeface="Cambria Math" panose="02040503050406030204" pitchFamily="18" charset="0"/>
+                                      </a:rPr>
+                                      <m:t>𝑜</m:t>
+                                    </m:r>
+                                  </m:e>
+                                  <m:sub>
+                                    <m:r>
+                                      <a:rPr lang="en-US" altLang="ko-KR" b="0" i="1" smtClean="0">
+                                        <a:latin typeface="Cambria Math" panose="02040503050406030204" pitchFamily="18" charset="0"/>
+                                      </a:rPr>
+                                      <m:t>𝑗</m:t>
+                                    </m:r>
+                                  </m:sub>
+                                </m:sSub>
+                              </m:sup>
+                            </m:sSup>
+                          </m:e>
+                        </m:nary>
+                      </m:den>
+                    </m:f>
+                  </m:oMath>
+                </a14:m>
+                <a:endParaRPr lang="ko-KR" altLang="en-US" dirty="0"/>
+              </a:p>
+            </p:txBody>
+          </p:sp>
+        </mc:Choice>
+        <mc:Fallback>
+          <p:sp>
+            <p:nvSpPr>
+              <p:cNvPr id="3" name="내용 개체 틀 2">
+                <a:extLst>
+                  <a:ext uri="{FF2B5EF4-FFF2-40B4-BE49-F238E27FC236}">
+                    <a16:creationId xmlns:a16="http://schemas.microsoft.com/office/drawing/2014/main" id="{EABA7002-F9E4-4335-90C3-263538207351}"/>
+                  </a:ext>
+                </a:extLst>
+              </p:cNvPr>
+              <p:cNvSpPr>
+                <a:spLocks noGrp="1" noRot="1" noChangeAspect="1" noMove="1" noResize="1" noEditPoints="1" noAdjustHandles="1" noChangeArrowheads="1" noChangeShapeType="1" noTextEdit="1"/>
+              </p:cNvSpPr>
+              <p:nvPr>
+                <p:ph idx="1"/>
+              </p:nvPr>
+            </p:nvSpPr>
+            <p:spPr>
+              <a:blipFill>
+                <a:blip r:embed="rId2"/>
+                <a:stretch>
+                  <a:fillRect l="-1043" t="-1401"/>
+                </a:stretch>
+              </a:blipFill>
+            </p:spPr>
+            <p:txBody>
+              <a:bodyPr/>
+              <a:lstStyle/>
+              <a:p>
+                <a:r>
+                  <a:rPr lang="ko-KR" altLang="en-US">
+                    <a:noFill/>
+                  </a:rPr>
+                  <a:t> </a:t>
+                </a:r>
+              </a:p>
+            </p:txBody>
+          </p:sp>
+        </mc:Fallback>
+      </mc:AlternateContent>
+    </p:spTree>
+    <p:extLst>
+      <p:ext uri="{BB962C8B-B14F-4D97-AF65-F5344CB8AC3E}">
+        <p14:creationId xmlns:p14="http://schemas.microsoft.com/office/powerpoint/2010/main" val="965909426"/>
+      </p:ext>
+    </p:extLst>
+  </p:cSld>
+  <p:clrMapOvr>
+    <a:masterClrMapping/>
+  </p:clrMapOvr>
+</p:sld>
+</file>
+
+<file path=ppt/slides/slide41.xml><?xml version="1.0" encoding="utf-8"?>
+<p:sld xmlns:a="http://schemas.openxmlformats.org/drawingml/2006/main" xmlns:r="http://schemas.openxmlformats.org/officeDocument/2006/relationships" xmlns:p="http://schemas.openxmlformats.org/presentationml/2006/main">
+  <p:cSld>
+    <p:spTree>
+      <p:nvGrpSpPr>
+        <p:cNvPr id="1" name=""/>
+        <p:cNvGrpSpPr/>
+        <p:nvPr/>
+      </p:nvGrpSpPr>
+      <p:grpSpPr>
+        <a:xfrm>
+          <a:off x="0" y="0"/>
+          <a:ext cx="0" cy="0"/>
+          <a:chOff x="0" y="0"/>
+          <a:chExt cx="0" cy="0"/>
+        </a:xfrm>
+      </p:grpSpPr>
+      <p:sp>
+        <p:nvSpPr>
+          <p:cNvPr id="2" name="제목 1">
+            <a:extLst>
+              <a:ext uri="{FF2B5EF4-FFF2-40B4-BE49-F238E27FC236}">
+                <a16:creationId xmlns:a16="http://schemas.microsoft.com/office/drawing/2014/main" id="{2F5F7A1C-5184-44CC-B538-D386C16C2D51}"/>
+              </a:ext>
+            </a:extLst>
+          </p:cNvPr>
+          <p:cNvSpPr>
+            <a:spLocks noGrp="1"/>
+          </p:cNvSpPr>
+          <p:nvPr>
+            <p:ph type="title"/>
+          </p:nvPr>
+        </p:nvSpPr>
+        <p:spPr/>
+        <p:txBody>
+          <a:bodyPr/>
+          <a:lstStyle/>
+          <a:p>
+            <a:r>
+              <a:rPr lang="ko-KR" altLang="en-US" dirty="0"/>
+              <a:t>여러 손실 함수</a:t>
+            </a:r>
+          </a:p>
+        </p:txBody>
+      </p:sp>
+      <mc:AlternateContent xmlns:mc="http://schemas.openxmlformats.org/markup-compatibility/2006">
+        <mc:Choice xmlns:a14="http://schemas.microsoft.com/office/drawing/2010/main" Requires="a14">
+          <p:sp>
+            <p:nvSpPr>
+              <p:cNvPr id="3" name="내용 개체 틀 2">
+                <a:extLst>
+                  <a:ext uri="{FF2B5EF4-FFF2-40B4-BE49-F238E27FC236}">
+                    <a16:creationId xmlns:a16="http://schemas.microsoft.com/office/drawing/2014/main" id="{EB909CA3-57B7-499D-9087-1F6110587660}"/>
+                  </a:ext>
+                </a:extLst>
+              </p:cNvPr>
+              <p:cNvSpPr>
+                <a:spLocks noGrp="1"/>
+              </p:cNvSpPr>
+              <p:nvPr>
+                <p:ph idx="1"/>
+              </p:nvPr>
+            </p:nvSpPr>
+            <p:spPr>
+              <a:xfrm>
+                <a:off x="838200" y="1825624"/>
+                <a:ext cx="10515600" cy="4810067"/>
+              </a:xfrm>
+            </p:spPr>
+            <p:txBody>
+              <a:bodyPr>
+                <a:normAutofit/>
+              </a:bodyPr>
+              <a:lstStyle/>
+              <a:p>
+                <a:r>
+                  <a:rPr lang="en-US" altLang="ko-KR" dirty="0"/>
+                  <a:t>Cross Entropy </a:t>
+                </a:r>
+                <a:r>
+                  <a:rPr lang="ko-KR" altLang="en-US" dirty="0"/>
+                  <a:t>예시</a:t>
+                </a:r>
+                <a:br>
+                  <a:rPr lang="en-US" altLang="ko-KR" dirty="0"/>
+                </a:br>
+                <a:r>
+                  <a:rPr lang="en-US" altLang="ko-KR" dirty="0"/>
+                  <a:t>o</a:t>
+                </a:r>
+                <a:r>
+                  <a:rPr lang="ko-KR" altLang="en-US" dirty="0"/>
+                  <a:t>는 모델의 예측 결과</a:t>
+                </a:r>
+                <a:r>
+                  <a:rPr lang="en-US" altLang="ko-KR" dirty="0"/>
+                  <a:t>(3</a:t>
+                </a:r>
+                <a:r>
+                  <a:rPr lang="ko-KR" altLang="en-US" dirty="0"/>
+                  <a:t>개의 클래스</a:t>
+                </a:r>
+                <a:r>
+                  <a:rPr lang="en-US" altLang="ko-KR" dirty="0"/>
+                  <a:t>),</a:t>
+                </a:r>
+                <a:br>
+                  <a:rPr lang="en-US" altLang="ko-KR" dirty="0"/>
+                </a:br>
+                <a:r>
+                  <a:rPr lang="en-US" altLang="ko-KR" dirty="0"/>
+                  <a:t>y</a:t>
+                </a:r>
+                <a:r>
+                  <a:rPr lang="ko-KR" altLang="en-US" dirty="0"/>
+                  <a:t>는 정답인 인덱스엔 </a:t>
+                </a:r>
+                <a:r>
+                  <a:rPr lang="en-US" altLang="ko-KR" dirty="0"/>
+                  <a:t>1</a:t>
+                </a:r>
+                <a:r>
+                  <a:rPr lang="ko-KR" altLang="en-US" dirty="0"/>
+                  <a:t>로 표시</a:t>
+                </a:r>
+                <a:r>
+                  <a:rPr lang="en-US" altLang="ko-KR" dirty="0"/>
+                  <a:t>, </a:t>
+                </a:r>
+                <a:br>
+                  <a:rPr lang="en-US" altLang="ko-KR" dirty="0"/>
+                </a:br>
+                <a14:m>
+                  <m:oMath xmlns:m="http://schemas.openxmlformats.org/officeDocument/2006/math">
+                    <m:r>
+                      <a:rPr lang="en-US" altLang="ko-KR" b="0" i="1" smtClean="0">
+                        <a:latin typeface="Cambria Math" panose="02040503050406030204" pitchFamily="18" charset="0"/>
+                      </a:rPr>
+                      <m:t>𝑜</m:t>
+                    </m:r>
+                    <m:r>
+                      <a:rPr lang="en-US" altLang="ko-KR" b="0" i="1" smtClean="0">
+                        <a:latin typeface="Cambria Math" panose="02040503050406030204" pitchFamily="18" charset="0"/>
+                      </a:rPr>
+                      <m:t>=</m:t>
+                    </m:r>
+                    <m:d>
+                      <m:dPr>
+                        <m:begChr m:val="["/>
+                        <m:endChr m:val="]"/>
+                        <m:ctrlPr>
+                          <a:rPr lang="en-US" altLang="ko-KR" b="0" i="1" smtClean="0">
+                            <a:latin typeface="Cambria Math" panose="02040503050406030204" pitchFamily="18" charset="0"/>
+                          </a:rPr>
+                        </m:ctrlPr>
+                      </m:dPr>
+                      <m:e>
+                        <m:r>
+                          <a:rPr lang="en-US" altLang="ko-KR" b="0" i="1" smtClean="0">
+                            <a:latin typeface="Cambria Math" panose="02040503050406030204" pitchFamily="18" charset="0"/>
+                          </a:rPr>
+                          <m:t>0.1,0.8,0.1</m:t>
+                        </m:r>
+                      </m:e>
+                    </m:d>
+                    <m:r>
+                      <a:rPr lang="en-US" altLang="ko-KR" b="0" i="1" smtClean="0">
+                        <a:latin typeface="Cambria Math" panose="02040503050406030204" pitchFamily="18" charset="0"/>
+                      </a:rPr>
+                      <m:t>,</m:t>
+                    </m:r>
+                  </m:oMath>
+                </a14:m>
+                <a:br>
+                  <a:rPr lang="en-US" altLang="ko-KR" b="0" dirty="0"/>
+                </a:br>
+                <a14:m>
+                  <m:oMath xmlns:m="http://schemas.openxmlformats.org/officeDocument/2006/math">
+                    <m:r>
+                      <a:rPr lang="en-US" altLang="ko-KR" b="0" i="1" smtClean="0">
+                        <a:latin typeface="Cambria Math" panose="02040503050406030204" pitchFamily="18" charset="0"/>
+                      </a:rPr>
+                      <m:t>𝑦</m:t>
+                    </m:r>
+                    <m:r>
+                      <a:rPr lang="en-US" altLang="ko-KR" b="0" i="1" smtClean="0">
+                        <a:latin typeface="Cambria Math" panose="02040503050406030204" pitchFamily="18" charset="0"/>
+                      </a:rPr>
+                      <m:t>=</m:t>
+                    </m:r>
+                    <m:d>
+                      <m:dPr>
+                        <m:begChr m:val="["/>
+                        <m:endChr m:val="]"/>
+                        <m:ctrlPr>
+                          <a:rPr lang="en-US" altLang="ko-KR" b="0" i="1" smtClean="0">
+                            <a:latin typeface="Cambria Math" panose="02040503050406030204" pitchFamily="18" charset="0"/>
+                          </a:rPr>
+                        </m:ctrlPr>
+                      </m:dPr>
+                      <m:e>
+                        <m:r>
+                          <a:rPr lang="en-US" altLang="ko-KR" b="0" i="1" smtClean="0">
+                            <a:latin typeface="Cambria Math" panose="02040503050406030204" pitchFamily="18" charset="0"/>
+                          </a:rPr>
+                          <m:t>0,1,0</m:t>
+                        </m:r>
+                      </m:e>
+                    </m:d>
+                  </m:oMath>
+                </a14:m>
+                <a:endParaRPr lang="en-US" altLang="ko-KR" b="0" dirty="0"/>
+              </a:p>
+              <a:p>
+                <a:r>
+                  <a:rPr lang="en-US" altLang="ko-KR" dirty="0"/>
+                  <a:t>o</a:t>
+                </a:r>
+                <a:r>
+                  <a:rPr lang="ko-KR" altLang="en-US" b="0" dirty="0"/>
+                  <a:t>를 </a:t>
+                </a:r>
+                <a:r>
+                  <a:rPr lang="en-US" altLang="ko-KR" b="0" dirty="0" err="1"/>
+                  <a:t>softmax</a:t>
+                </a:r>
+                <a:r>
+                  <a:rPr lang="ko-KR" altLang="en-US" b="0" dirty="0"/>
+                  <a:t>를 거치면</a:t>
+                </a:r>
+                <a:br>
+                  <a:rPr lang="en-US" altLang="ko-KR" b="0" dirty="0"/>
+                </a:br>
+                <a14:m>
+                  <m:oMath xmlns:m="http://schemas.openxmlformats.org/officeDocument/2006/math">
+                    <m:r>
+                      <a:rPr lang="en-US" altLang="ko-KR" b="0" i="1" smtClean="0">
+                        <a:latin typeface="Cambria Math" panose="02040503050406030204" pitchFamily="18" charset="0"/>
+                      </a:rPr>
+                      <m:t>𝑠𝑜𝑓𝑡𝑚𝑎𝑥</m:t>
+                    </m:r>
+                    <m:d>
+                      <m:dPr>
+                        <m:ctrlPr>
+                          <a:rPr lang="en-US" altLang="ko-KR" b="0" i="1" smtClean="0">
+                            <a:latin typeface="Cambria Math" panose="02040503050406030204" pitchFamily="18" charset="0"/>
+                          </a:rPr>
+                        </m:ctrlPr>
+                      </m:dPr>
+                      <m:e>
+                        <m:r>
+                          <a:rPr lang="en-US" altLang="ko-KR" b="0" i="1" smtClean="0">
+                            <a:latin typeface="Cambria Math" panose="02040503050406030204" pitchFamily="18" charset="0"/>
+                          </a:rPr>
+                          <m:t>𝑜</m:t>
+                        </m:r>
+                      </m:e>
+                    </m:d>
+                    <m:r>
+                      <a:rPr lang="en-US" altLang="ko-KR" b="0" i="1" smtClean="0">
+                        <a:latin typeface="Cambria Math" panose="02040503050406030204" pitchFamily="18" charset="0"/>
+                      </a:rPr>
+                      <m:t>=</m:t>
+                    </m:r>
+                    <m:d>
+                      <m:dPr>
+                        <m:begChr m:val="["/>
+                        <m:endChr m:val="]"/>
+                        <m:ctrlPr>
+                          <a:rPr lang="en-US" altLang="ko-KR" b="0" i="1" smtClean="0">
+                            <a:latin typeface="Cambria Math" panose="02040503050406030204" pitchFamily="18" charset="0"/>
+                          </a:rPr>
+                        </m:ctrlPr>
+                      </m:dPr>
+                      <m:e>
+                        <m:r>
+                          <a:rPr lang="en-US" altLang="ko-KR" b="0" i="1" smtClean="0">
+                            <a:latin typeface="Cambria Math" panose="02040503050406030204" pitchFamily="18" charset="0"/>
+                          </a:rPr>
+                          <m:t>0.2491,0.5017,0.2491</m:t>
+                        </m:r>
+                      </m:e>
+                    </m:d>
+                  </m:oMath>
+                </a14:m>
+                <a:endParaRPr lang="en-US" altLang="ko-KR" b="0" dirty="0"/>
+              </a:p>
+            </p:txBody>
+          </p:sp>
+        </mc:Choice>
+        <mc:Fallback>
+          <p:sp>
+            <p:nvSpPr>
+              <p:cNvPr id="3" name="내용 개체 틀 2">
+                <a:extLst>
+                  <a:ext uri="{FF2B5EF4-FFF2-40B4-BE49-F238E27FC236}">
+                    <a16:creationId xmlns:a16="http://schemas.microsoft.com/office/drawing/2014/main" id="{EB909CA3-57B7-499D-9087-1F6110587660}"/>
+                  </a:ext>
+                </a:extLst>
+              </p:cNvPr>
+              <p:cNvSpPr>
+                <a:spLocks noGrp="1" noRot="1" noChangeAspect="1" noMove="1" noResize="1" noEditPoints="1" noAdjustHandles="1" noChangeArrowheads="1" noChangeShapeType="1" noTextEdit="1"/>
+              </p:cNvSpPr>
+              <p:nvPr>
+                <p:ph idx="1"/>
+              </p:nvPr>
+            </p:nvSpPr>
+            <p:spPr>
+              <a:xfrm>
+                <a:off x="838200" y="1825624"/>
+                <a:ext cx="10515600" cy="4810067"/>
+              </a:xfrm>
+              <a:blipFill>
+                <a:blip r:embed="rId2"/>
+                <a:stretch>
+                  <a:fillRect l="-1043" t="-1266"/>
+                </a:stretch>
+              </a:blipFill>
+            </p:spPr>
+            <p:txBody>
+              <a:bodyPr/>
+              <a:lstStyle/>
+              <a:p>
+                <a:r>
+                  <a:rPr lang="ko-KR" altLang="en-US">
+                    <a:noFill/>
+                  </a:rPr>
+                  <a:t> </a:t>
+                </a:r>
+              </a:p>
+            </p:txBody>
+          </p:sp>
+        </mc:Fallback>
+      </mc:AlternateContent>
+    </p:spTree>
+    <p:extLst>
+      <p:ext uri="{BB962C8B-B14F-4D97-AF65-F5344CB8AC3E}">
+        <p14:creationId xmlns:p14="http://schemas.microsoft.com/office/powerpoint/2010/main" val="3160909548"/>
+      </p:ext>
+    </p:extLst>
+  </p:cSld>
+  <p:clrMapOvr>
+    <a:masterClrMapping/>
+  </p:clrMapOvr>
+</p:sld>
+</file>
+
+<file path=ppt/slides/slide42.xml><?xml version="1.0" encoding="utf-8"?>
+<p:sld xmlns:a="http://schemas.openxmlformats.org/drawingml/2006/main" xmlns:r="http://schemas.openxmlformats.org/officeDocument/2006/relationships" xmlns:p="http://schemas.openxmlformats.org/presentationml/2006/main">
+  <p:cSld>
+    <p:spTree>
+      <p:nvGrpSpPr>
+        <p:cNvPr id="1" name=""/>
+        <p:cNvGrpSpPr/>
+        <p:nvPr/>
+      </p:nvGrpSpPr>
+      <p:grpSpPr>
+        <a:xfrm>
+          <a:off x="0" y="0"/>
+          <a:ext cx="0" cy="0"/>
+          <a:chOff x="0" y="0"/>
+          <a:chExt cx="0" cy="0"/>
+        </a:xfrm>
+      </p:grpSpPr>
+      <p:sp>
+        <p:nvSpPr>
+          <p:cNvPr id="2" name="제목 1">
+            <a:extLst>
+              <a:ext uri="{FF2B5EF4-FFF2-40B4-BE49-F238E27FC236}">
+                <a16:creationId xmlns:a16="http://schemas.microsoft.com/office/drawing/2014/main" id="{87784F44-ED85-4B4E-A464-6460C31BD893}"/>
+              </a:ext>
+            </a:extLst>
+          </p:cNvPr>
+          <p:cNvSpPr>
+            <a:spLocks noGrp="1"/>
+          </p:cNvSpPr>
+          <p:nvPr>
+            <p:ph type="title"/>
+          </p:nvPr>
+        </p:nvSpPr>
+        <p:spPr/>
+        <p:txBody>
+          <a:bodyPr/>
+          <a:lstStyle/>
+          <a:p>
+            <a:r>
+              <a:rPr lang="ko-KR" altLang="en-US" dirty="0"/>
+              <a:t>여러 손실 함수</a:t>
+            </a:r>
+          </a:p>
+        </p:txBody>
+      </p:sp>
+      <mc:AlternateContent xmlns:mc="http://schemas.openxmlformats.org/markup-compatibility/2006">
+        <mc:Choice xmlns:a14="http://schemas.microsoft.com/office/drawing/2010/main" Requires="a14">
+          <p:sp>
+            <p:nvSpPr>
+              <p:cNvPr id="3" name="내용 개체 틀 2">
+                <a:extLst>
+                  <a:ext uri="{FF2B5EF4-FFF2-40B4-BE49-F238E27FC236}">
+                    <a16:creationId xmlns:a16="http://schemas.microsoft.com/office/drawing/2014/main" id="{8F33D609-4100-470D-94C8-0518CA839F19}"/>
+                  </a:ext>
+                </a:extLst>
+              </p:cNvPr>
+              <p:cNvSpPr>
+                <a:spLocks noGrp="1"/>
+              </p:cNvSpPr>
+              <p:nvPr>
+                <p:ph idx="1"/>
+              </p:nvPr>
+            </p:nvSpPr>
+            <p:spPr/>
+            <p:txBody>
+              <a:bodyPr/>
+              <a:lstStyle/>
+              <a:p>
+                <a:r>
+                  <a:rPr lang="ko-KR" altLang="en-US" dirty="0"/>
+                  <a:t>따라서 </a:t>
+                </a:r>
+                <a:r>
+                  <a:rPr lang="en-US" altLang="ko-KR" dirty="0"/>
+                  <a:t>Cross Entropy</a:t>
+                </a:r>
+                <a:r>
+                  <a:rPr lang="ko-KR" altLang="en-US" dirty="0"/>
+                  <a:t>는</a:t>
+                </a:r>
+                <a:br>
+                  <a:rPr lang="en-US" altLang="ko-KR" dirty="0"/>
+                </a:br>
+                <a14:m>
+                  <m:oMath xmlns:m="http://schemas.openxmlformats.org/officeDocument/2006/math">
+                    <m:r>
+                      <a:rPr lang="en-US" altLang="ko-KR" sz="2400" b="0" i="1" smtClean="0">
+                        <a:latin typeface="Cambria Math" panose="02040503050406030204" pitchFamily="18" charset="0"/>
+                      </a:rPr>
+                      <m:t>𝐶𝐸</m:t>
+                    </m:r>
+                    <m:r>
+                      <a:rPr lang="en-US" altLang="ko-KR" sz="2400" b="0" i="1" smtClean="0">
+                        <a:latin typeface="Cambria Math" panose="02040503050406030204" pitchFamily="18" charset="0"/>
+                      </a:rPr>
+                      <m:t>=−</m:t>
+                    </m:r>
+                    <m:sSub>
+                      <m:sSubPr>
+                        <m:ctrlPr>
+                          <a:rPr lang="en-US" altLang="ko-KR" sz="2400" b="0" i="1" smtClean="0">
+                            <a:latin typeface="Cambria Math" panose="02040503050406030204" pitchFamily="18" charset="0"/>
+                          </a:rPr>
+                        </m:ctrlPr>
+                      </m:sSubPr>
+                      <m:e>
+                        <m:r>
+                          <a:rPr lang="en-US" altLang="ko-KR" sz="2400" b="0" i="1" smtClean="0">
+                            <a:latin typeface="Cambria Math" panose="02040503050406030204" pitchFamily="18" charset="0"/>
+                          </a:rPr>
+                          <m:t>𝑦</m:t>
+                        </m:r>
+                      </m:e>
+                      <m:sub>
+                        <m:r>
+                          <a:rPr lang="en-US" altLang="ko-KR" sz="2400" b="0" i="1" smtClean="0">
+                            <a:latin typeface="Cambria Math" panose="02040503050406030204" pitchFamily="18" charset="0"/>
+                          </a:rPr>
+                          <m:t>0</m:t>
+                        </m:r>
+                      </m:sub>
+                    </m:sSub>
+                    <m:func>
+                      <m:funcPr>
+                        <m:ctrlPr>
+                          <a:rPr lang="en-US" altLang="ko-KR" sz="2400" b="0" i="1" smtClean="0">
+                            <a:latin typeface="Cambria Math" panose="02040503050406030204" pitchFamily="18" charset="0"/>
+                          </a:rPr>
+                        </m:ctrlPr>
+                      </m:funcPr>
+                      <m:fName>
+                        <m:r>
+                          <m:rPr>
+                            <m:sty m:val="p"/>
+                          </m:rPr>
+                          <a:rPr lang="en-US" altLang="ko-KR" sz="2400" b="0" i="0" smtClean="0">
+                            <a:latin typeface="Cambria Math" panose="02040503050406030204" pitchFamily="18" charset="0"/>
+                          </a:rPr>
+                          <m:t>log</m:t>
+                        </m:r>
+                      </m:fName>
+                      <m:e>
+                        <m:d>
+                          <m:dPr>
+                            <m:ctrlPr>
+                              <a:rPr lang="en-US" altLang="ko-KR" sz="2400" b="0" i="1" smtClean="0">
+                                <a:latin typeface="Cambria Math" panose="02040503050406030204" pitchFamily="18" charset="0"/>
+                              </a:rPr>
+                            </m:ctrlPr>
+                          </m:dPr>
+                          <m:e>
+                            <m:r>
+                              <a:rPr lang="en-US" altLang="ko-KR" sz="2400" b="0" i="1" smtClean="0">
+                                <a:latin typeface="Cambria Math" panose="02040503050406030204" pitchFamily="18" charset="0"/>
+                              </a:rPr>
+                              <m:t>𝑠𝑜𝑓𝑡𝑚𝑎𝑥</m:t>
+                            </m:r>
+                            <m:d>
+                              <m:dPr>
+                                <m:ctrlPr>
+                                  <a:rPr lang="en-US" altLang="ko-KR" sz="2400" b="0" i="1" smtClean="0">
+                                    <a:latin typeface="Cambria Math" panose="02040503050406030204" pitchFamily="18" charset="0"/>
+                                  </a:rPr>
+                                </m:ctrlPr>
+                              </m:dPr>
+                              <m:e>
+                                <m:sSub>
+                                  <m:sSubPr>
+                                    <m:ctrlPr>
+                                      <a:rPr lang="en-US" altLang="ko-KR" sz="2400" b="0" i="1" smtClean="0">
+                                        <a:latin typeface="Cambria Math" panose="02040503050406030204" pitchFamily="18" charset="0"/>
+                                      </a:rPr>
+                                    </m:ctrlPr>
+                                  </m:sSubPr>
+                                  <m:e>
+                                    <m:r>
+                                      <a:rPr lang="en-US" altLang="ko-KR" sz="2400" b="0" i="1" smtClean="0">
+                                        <a:latin typeface="Cambria Math" panose="02040503050406030204" pitchFamily="18" charset="0"/>
+                                      </a:rPr>
+                                      <m:t>𝑜</m:t>
+                                    </m:r>
+                                  </m:e>
+                                  <m:sub>
+                                    <m:r>
+                                      <a:rPr lang="en-US" altLang="ko-KR" sz="2400" b="0" i="1" smtClean="0">
+                                        <a:latin typeface="Cambria Math" panose="02040503050406030204" pitchFamily="18" charset="0"/>
+                                      </a:rPr>
+                                      <m:t>0</m:t>
+                                    </m:r>
+                                  </m:sub>
+                                </m:sSub>
+                              </m:e>
+                            </m:d>
+                          </m:e>
+                        </m:d>
+                      </m:e>
+                    </m:func>
+                    <m:r>
+                      <a:rPr lang="en-US" altLang="ko-KR" sz="2400" b="0" i="1" smtClean="0">
+                        <a:latin typeface="Cambria Math" panose="02040503050406030204" pitchFamily="18" charset="0"/>
+                      </a:rPr>
+                      <m:t>−</m:t>
+                    </m:r>
+                    <m:sSub>
+                      <m:sSubPr>
+                        <m:ctrlPr>
+                          <a:rPr lang="en-US" altLang="ko-KR" sz="2400" b="0" i="1" smtClean="0">
+                            <a:latin typeface="Cambria Math" panose="02040503050406030204" pitchFamily="18" charset="0"/>
+                          </a:rPr>
+                        </m:ctrlPr>
+                      </m:sSubPr>
+                      <m:e>
+                        <m:r>
+                          <a:rPr lang="en-US" altLang="ko-KR" sz="2400" b="0" i="1" smtClean="0">
+                            <a:latin typeface="Cambria Math" panose="02040503050406030204" pitchFamily="18" charset="0"/>
+                          </a:rPr>
+                          <m:t>𝑦</m:t>
+                        </m:r>
+                      </m:e>
+                      <m:sub>
+                        <m:r>
+                          <a:rPr lang="en-US" altLang="ko-KR" sz="2400" b="0" i="1" smtClean="0">
+                            <a:latin typeface="Cambria Math" panose="02040503050406030204" pitchFamily="18" charset="0"/>
+                          </a:rPr>
+                          <m:t>1</m:t>
+                        </m:r>
+                      </m:sub>
+                    </m:sSub>
+                    <m:func>
+                      <m:funcPr>
+                        <m:ctrlPr>
+                          <a:rPr lang="en-US" altLang="ko-KR" sz="2400" b="0" i="1" smtClean="0">
+                            <a:latin typeface="Cambria Math" panose="02040503050406030204" pitchFamily="18" charset="0"/>
+                          </a:rPr>
+                        </m:ctrlPr>
+                      </m:funcPr>
+                      <m:fName>
+                        <m:r>
+                          <m:rPr>
+                            <m:sty m:val="p"/>
+                          </m:rPr>
+                          <a:rPr lang="en-US" altLang="ko-KR" sz="2400" b="0" i="0" smtClean="0">
+                            <a:latin typeface="Cambria Math" panose="02040503050406030204" pitchFamily="18" charset="0"/>
+                          </a:rPr>
+                          <m:t>log</m:t>
+                        </m:r>
+                      </m:fName>
+                      <m:e>
+                        <m:d>
+                          <m:dPr>
+                            <m:ctrlPr>
+                              <a:rPr lang="en-US" altLang="ko-KR" sz="2400" b="0" i="1" smtClean="0">
+                                <a:latin typeface="Cambria Math" panose="02040503050406030204" pitchFamily="18" charset="0"/>
+                              </a:rPr>
+                            </m:ctrlPr>
+                          </m:dPr>
+                          <m:e>
+                            <m:r>
+                              <a:rPr lang="en-US" altLang="ko-KR" sz="2400" b="0" i="1" smtClean="0">
+                                <a:latin typeface="Cambria Math" panose="02040503050406030204" pitchFamily="18" charset="0"/>
+                              </a:rPr>
+                              <m:t>𝑠𝑜𝑓𝑡𝑚𝑎𝑥</m:t>
+                            </m:r>
+                            <m:d>
+                              <m:dPr>
+                                <m:ctrlPr>
+                                  <a:rPr lang="en-US" altLang="ko-KR" sz="2400" b="0" i="1" smtClean="0">
+                                    <a:latin typeface="Cambria Math" panose="02040503050406030204" pitchFamily="18" charset="0"/>
+                                  </a:rPr>
+                                </m:ctrlPr>
+                              </m:dPr>
+                              <m:e>
+                                <m:sSub>
+                                  <m:sSubPr>
+                                    <m:ctrlPr>
+                                      <a:rPr lang="en-US" altLang="ko-KR" sz="2400" b="0" i="1" smtClean="0">
+                                        <a:latin typeface="Cambria Math" panose="02040503050406030204" pitchFamily="18" charset="0"/>
+                                      </a:rPr>
+                                    </m:ctrlPr>
+                                  </m:sSubPr>
+                                  <m:e>
+                                    <m:r>
+                                      <a:rPr lang="en-US" altLang="ko-KR" sz="2400" b="0" i="1" smtClean="0">
+                                        <a:latin typeface="Cambria Math" panose="02040503050406030204" pitchFamily="18" charset="0"/>
+                                      </a:rPr>
+                                      <m:t>𝑜</m:t>
+                                    </m:r>
+                                  </m:e>
+                                  <m:sub>
+                                    <m:r>
+                                      <a:rPr lang="en-US" altLang="ko-KR" sz="2400" b="0" i="1" smtClean="0">
+                                        <a:latin typeface="Cambria Math" panose="02040503050406030204" pitchFamily="18" charset="0"/>
+                                      </a:rPr>
+                                      <m:t>1</m:t>
+                                    </m:r>
+                                  </m:sub>
+                                </m:sSub>
+                              </m:e>
+                            </m:d>
+                          </m:e>
+                        </m:d>
+                      </m:e>
+                    </m:func>
+                    <m:r>
+                      <a:rPr lang="en-US" altLang="ko-KR" sz="2400" b="0" i="1" smtClean="0">
+                        <a:latin typeface="Cambria Math" panose="02040503050406030204" pitchFamily="18" charset="0"/>
+                      </a:rPr>
+                      <m:t>−</m:t>
+                    </m:r>
+                    <m:sSub>
+                      <m:sSubPr>
+                        <m:ctrlPr>
+                          <a:rPr lang="en-US" altLang="ko-KR" sz="2400" b="0" i="1" smtClean="0">
+                            <a:latin typeface="Cambria Math" panose="02040503050406030204" pitchFamily="18" charset="0"/>
+                          </a:rPr>
+                        </m:ctrlPr>
+                      </m:sSubPr>
+                      <m:e>
+                        <m:r>
+                          <a:rPr lang="en-US" altLang="ko-KR" sz="2400" b="0" i="1" smtClean="0">
+                            <a:latin typeface="Cambria Math" panose="02040503050406030204" pitchFamily="18" charset="0"/>
+                          </a:rPr>
+                          <m:t>𝑦</m:t>
+                        </m:r>
+                      </m:e>
+                      <m:sub>
+                        <m:r>
+                          <a:rPr lang="en-US" altLang="ko-KR" sz="2400" b="0" i="1" smtClean="0">
+                            <a:latin typeface="Cambria Math" panose="02040503050406030204" pitchFamily="18" charset="0"/>
+                          </a:rPr>
+                          <m:t>2</m:t>
+                        </m:r>
+                      </m:sub>
+                    </m:sSub>
+                    <m:func>
+                      <m:funcPr>
+                        <m:ctrlPr>
+                          <a:rPr lang="en-US" altLang="ko-KR" sz="2400" b="0" i="1" smtClean="0">
+                            <a:latin typeface="Cambria Math" panose="02040503050406030204" pitchFamily="18" charset="0"/>
+                          </a:rPr>
+                        </m:ctrlPr>
+                      </m:funcPr>
+                      <m:fName>
+                        <m:r>
+                          <m:rPr>
+                            <m:sty m:val="p"/>
+                          </m:rPr>
+                          <a:rPr lang="en-US" altLang="ko-KR" sz="2400" b="0" i="0" smtClean="0">
+                            <a:latin typeface="Cambria Math" panose="02040503050406030204" pitchFamily="18" charset="0"/>
+                          </a:rPr>
+                          <m:t>log</m:t>
+                        </m:r>
+                      </m:fName>
+                      <m:e>
+                        <m:d>
+                          <m:dPr>
+                            <m:ctrlPr>
+                              <a:rPr lang="en-US" altLang="ko-KR" sz="2400" b="0" i="1" smtClean="0">
+                                <a:latin typeface="Cambria Math" panose="02040503050406030204" pitchFamily="18" charset="0"/>
+                              </a:rPr>
+                            </m:ctrlPr>
+                          </m:dPr>
+                          <m:e>
+                            <m:r>
+                              <a:rPr lang="en-US" altLang="ko-KR" sz="2400" b="0" i="1" smtClean="0">
+                                <a:latin typeface="Cambria Math" panose="02040503050406030204" pitchFamily="18" charset="0"/>
+                              </a:rPr>
+                              <m:t>𝑠𝑜𝑓𝑡𝑚𝑎𝑥</m:t>
+                            </m:r>
+                            <m:d>
+                              <m:dPr>
+                                <m:ctrlPr>
+                                  <a:rPr lang="en-US" altLang="ko-KR" sz="2400" b="0" i="1" smtClean="0">
+                                    <a:latin typeface="Cambria Math" panose="02040503050406030204" pitchFamily="18" charset="0"/>
+                                  </a:rPr>
+                                </m:ctrlPr>
+                              </m:dPr>
+                              <m:e>
+                                <m:sSub>
+                                  <m:sSubPr>
+                                    <m:ctrlPr>
+                                      <a:rPr lang="en-US" altLang="ko-KR" sz="2400" b="0" i="1" smtClean="0">
+                                        <a:latin typeface="Cambria Math" panose="02040503050406030204" pitchFamily="18" charset="0"/>
+                                      </a:rPr>
+                                    </m:ctrlPr>
+                                  </m:sSubPr>
+                                  <m:e>
+                                    <m:r>
+                                      <a:rPr lang="en-US" altLang="ko-KR" sz="2400" b="0" i="1" smtClean="0">
+                                        <a:latin typeface="Cambria Math" panose="02040503050406030204" pitchFamily="18" charset="0"/>
+                                      </a:rPr>
+                                      <m:t>𝑜</m:t>
+                                    </m:r>
+                                  </m:e>
+                                  <m:sub>
+                                    <m:r>
+                                      <a:rPr lang="en-US" altLang="ko-KR" sz="2400" b="0" i="1" smtClean="0">
+                                        <a:latin typeface="Cambria Math" panose="02040503050406030204" pitchFamily="18" charset="0"/>
+                                      </a:rPr>
+                                      <m:t>2</m:t>
+                                    </m:r>
+                                  </m:sub>
+                                </m:sSub>
+                              </m:e>
+                            </m:d>
+                          </m:e>
+                        </m:d>
+                      </m:e>
+                    </m:func>
+                    <m:r>
+                      <a:rPr lang="en-US" altLang="ko-KR" sz="2400" b="0" i="1" smtClean="0">
+                        <a:latin typeface="Cambria Math" panose="02040503050406030204" pitchFamily="18" charset="0"/>
+                      </a:rPr>
+                      <m:t>=</m:t>
+                    </m:r>
+                  </m:oMath>
+                </a14:m>
+                <a:br>
+                  <a:rPr lang="en-US" altLang="ko-KR" sz="2400" b="0" dirty="0"/>
+                </a:br>
+                <a14:m>
+                  <m:oMath xmlns:m="http://schemas.openxmlformats.org/officeDocument/2006/math">
+                    <m:r>
+                      <a:rPr lang="en-US" altLang="ko-KR" sz="2400" b="0" i="1" smtClean="0">
+                        <a:latin typeface="Cambria Math" panose="02040503050406030204" pitchFamily="18" charset="0"/>
+                      </a:rPr>
+                      <m:t>=−0</m:t>
+                    </m:r>
+                    <m:r>
+                      <a:rPr lang="en-US" altLang="ko-KR" sz="2400" i="1">
+                        <a:latin typeface="Cambria Math" panose="02040503050406030204" pitchFamily="18" charset="0"/>
+                        <a:ea typeface="Cambria Math" panose="02040503050406030204" pitchFamily="18" charset="0"/>
+                      </a:rPr>
+                      <m:t>×</m:t>
+                    </m:r>
+                    <m:func>
+                      <m:funcPr>
+                        <m:ctrlPr>
+                          <a:rPr lang="en-US" altLang="ko-KR" sz="2400" b="0" i="1" smtClean="0">
+                            <a:latin typeface="Cambria Math" panose="02040503050406030204" pitchFamily="18" charset="0"/>
+                            <a:ea typeface="Cambria Math" panose="02040503050406030204" pitchFamily="18" charset="0"/>
+                          </a:rPr>
+                        </m:ctrlPr>
+                      </m:funcPr>
+                      <m:fName>
+                        <m:r>
+                          <m:rPr>
+                            <m:sty m:val="p"/>
+                          </m:rPr>
+                          <a:rPr lang="en-US" altLang="ko-KR" sz="2400" b="0" i="0" smtClean="0">
+                            <a:latin typeface="Cambria Math" panose="02040503050406030204" pitchFamily="18" charset="0"/>
+                            <a:ea typeface="Cambria Math" panose="02040503050406030204" pitchFamily="18" charset="0"/>
+                          </a:rPr>
+                          <m:t>log</m:t>
+                        </m:r>
+                      </m:fName>
+                      <m:e>
+                        <m:r>
+                          <a:rPr lang="en-US" altLang="ko-KR" sz="2400" b="0" i="1" smtClean="0">
+                            <a:latin typeface="Cambria Math" panose="02040503050406030204" pitchFamily="18" charset="0"/>
+                            <a:ea typeface="Cambria Math" panose="02040503050406030204" pitchFamily="18" charset="0"/>
+                          </a:rPr>
+                          <m:t>0.2491</m:t>
+                        </m:r>
+                      </m:e>
+                    </m:func>
+                    <m:r>
+                      <a:rPr lang="en-US" altLang="ko-KR" sz="2400" b="0" i="1" smtClean="0">
+                        <a:latin typeface="Cambria Math" panose="02040503050406030204" pitchFamily="18" charset="0"/>
+                        <a:ea typeface="Cambria Math" panose="02040503050406030204" pitchFamily="18" charset="0"/>
+                      </a:rPr>
+                      <m:t>−1×</m:t>
+                    </m:r>
+                    <m:func>
+                      <m:funcPr>
+                        <m:ctrlPr>
+                          <a:rPr lang="en-US" altLang="ko-KR" sz="2400" b="0" i="1" smtClean="0">
+                            <a:latin typeface="Cambria Math" panose="02040503050406030204" pitchFamily="18" charset="0"/>
+                            <a:ea typeface="Cambria Math" panose="02040503050406030204" pitchFamily="18" charset="0"/>
+                          </a:rPr>
+                        </m:ctrlPr>
+                      </m:funcPr>
+                      <m:fName>
+                        <m:r>
+                          <m:rPr>
+                            <m:sty m:val="p"/>
+                          </m:rPr>
+                          <a:rPr lang="en-US" altLang="ko-KR" sz="2400" b="0" i="0" smtClean="0">
+                            <a:latin typeface="Cambria Math" panose="02040503050406030204" pitchFamily="18" charset="0"/>
+                            <a:ea typeface="Cambria Math" panose="02040503050406030204" pitchFamily="18" charset="0"/>
+                          </a:rPr>
+                          <m:t>log</m:t>
+                        </m:r>
+                      </m:fName>
+                      <m:e>
+                        <m:r>
+                          <a:rPr lang="en-US" altLang="ko-KR" sz="2400" b="0" i="1" smtClean="0">
+                            <a:latin typeface="Cambria Math" panose="02040503050406030204" pitchFamily="18" charset="0"/>
+                            <a:ea typeface="Cambria Math" panose="02040503050406030204" pitchFamily="18" charset="0"/>
+                          </a:rPr>
+                          <m:t>0.5017</m:t>
+                        </m:r>
+                      </m:e>
+                    </m:func>
+                    <m:r>
+                      <a:rPr lang="en-US" altLang="ko-KR" sz="2400" b="0" i="1" smtClean="0">
+                        <a:latin typeface="Cambria Math" panose="02040503050406030204" pitchFamily="18" charset="0"/>
+                        <a:ea typeface="Cambria Math" panose="02040503050406030204" pitchFamily="18" charset="0"/>
+                      </a:rPr>
+                      <m:t>−0×</m:t>
+                    </m:r>
+                    <m:func>
+                      <m:funcPr>
+                        <m:ctrlPr>
+                          <a:rPr lang="en-US" altLang="ko-KR" sz="2400" b="0" i="1" smtClean="0">
+                            <a:latin typeface="Cambria Math" panose="02040503050406030204" pitchFamily="18" charset="0"/>
+                            <a:ea typeface="Cambria Math" panose="02040503050406030204" pitchFamily="18" charset="0"/>
+                          </a:rPr>
+                        </m:ctrlPr>
+                      </m:funcPr>
+                      <m:fName>
+                        <m:r>
+                          <m:rPr>
+                            <m:sty m:val="p"/>
+                          </m:rPr>
+                          <a:rPr lang="en-US" altLang="ko-KR" sz="2400" b="0" i="0" smtClean="0">
+                            <a:latin typeface="Cambria Math" panose="02040503050406030204" pitchFamily="18" charset="0"/>
+                            <a:ea typeface="Cambria Math" panose="02040503050406030204" pitchFamily="18" charset="0"/>
+                          </a:rPr>
+                          <m:t>log</m:t>
+                        </m:r>
+                      </m:fName>
+                      <m:e>
+                        <m:r>
+                          <a:rPr lang="en-US" altLang="ko-KR" sz="2400" b="0" i="1" smtClean="0">
+                            <a:latin typeface="Cambria Math" panose="02040503050406030204" pitchFamily="18" charset="0"/>
+                            <a:ea typeface="Cambria Math" panose="02040503050406030204" pitchFamily="18" charset="0"/>
+                          </a:rPr>
+                          <m:t>0.2491</m:t>
+                        </m:r>
+                      </m:e>
+                    </m:func>
+                    <m:r>
+                      <a:rPr lang="en-US" altLang="ko-KR" sz="2400" b="0" i="1" smtClean="0">
+                        <a:latin typeface="Cambria Math" panose="02040503050406030204" pitchFamily="18" charset="0"/>
+                        <a:ea typeface="Cambria Math" panose="02040503050406030204" pitchFamily="18" charset="0"/>
+                      </a:rPr>
+                      <m:t>=0.6897</m:t>
+                    </m:r>
+                  </m:oMath>
+                </a14:m>
+                <a:endParaRPr lang="en-US" altLang="ko-KR" sz="2400" b="0" dirty="0"/>
+              </a:p>
+              <a:p>
+                <a:endParaRPr lang="ko-KR" altLang="en-US" dirty="0"/>
+              </a:p>
+            </p:txBody>
+          </p:sp>
+        </mc:Choice>
+        <mc:Fallback>
+          <p:sp>
+            <p:nvSpPr>
+              <p:cNvPr id="3" name="내용 개체 틀 2">
+                <a:extLst>
+                  <a:ext uri="{FF2B5EF4-FFF2-40B4-BE49-F238E27FC236}">
+                    <a16:creationId xmlns:a16="http://schemas.microsoft.com/office/drawing/2014/main" id="{8F33D609-4100-470D-94C8-0518CA839F19}"/>
+                  </a:ext>
+                </a:extLst>
+              </p:cNvPr>
+              <p:cNvSpPr>
+                <a:spLocks noGrp="1" noRot="1" noChangeAspect="1" noMove="1" noResize="1" noEditPoints="1" noAdjustHandles="1" noChangeArrowheads="1" noChangeShapeType="1" noTextEdit="1"/>
+              </p:cNvSpPr>
+              <p:nvPr>
+                <p:ph idx="1"/>
+              </p:nvPr>
+            </p:nvSpPr>
+            <p:spPr>
+              <a:blipFill>
+                <a:blip r:embed="rId2"/>
+                <a:stretch>
+                  <a:fillRect l="-1043" t="-1401"/>
+                </a:stretch>
+              </a:blipFill>
+            </p:spPr>
+            <p:txBody>
+              <a:bodyPr/>
+              <a:lstStyle/>
+              <a:p>
+                <a:r>
+                  <a:rPr lang="ko-KR" altLang="en-US">
+                    <a:noFill/>
+                  </a:rPr>
+                  <a:t> </a:t>
+                </a:r>
+              </a:p>
+            </p:txBody>
+          </p:sp>
+        </mc:Fallback>
+      </mc:AlternateContent>
+    </p:spTree>
+    <p:extLst>
+      <p:ext uri="{BB962C8B-B14F-4D97-AF65-F5344CB8AC3E}">
+        <p14:creationId xmlns:p14="http://schemas.microsoft.com/office/powerpoint/2010/main" val="4264188951"/>
+      </p:ext>
+    </p:extLst>
+  </p:cSld>
+  <p:clrMapOvr>
+    <a:masterClrMapping/>
+  </p:clrMapOvr>
+</p:sld>
+</file>
+
+<file path=ppt/slides/slide43.xml><?xml version="1.0" encoding="utf-8"?>
+<p:sld xmlns:a="http://schemas.openxmlformats.org/drawingml/2006/main" xmlns:r="http://schemas.openxmlformats.org/officeDocument/2006/relationships" xmlns:p="http://schemas.openxmlformats.org/presentationml/2006/main">
+  <p:cSld>
+    <p:spTree>
+      <p:nvGrpSpPr>
+        <p:cNvPr id="1" name=""/>
+        <p:cNvGrpSpPr/>
+        <p:nvPr/>
+      </p:nvGrpSpPr>
+      <p:grpSpPr>
+        <a:xfrm>
+          <a:off x="0" y="0"/>
+          <a:ext cx="0" cy="0"/>
+          <a:chOff x="0" y="0"/>
+          <a:chExt cx="0" cy="0"/>
+        </a:xfrm>
+      </p:grpSpPr>
+      <p:sp>
+        <p:nvSpPr>
+          <p:cNvPr id="2" name="제목 1">
+            <a:extLst>
+              <a:ext uri="{FF2B5EF4-FFF2-40B4-BE49-F238E27FC236}">
                 <a16:creationId xmlns:a16="http://schemas.microsoft.com/office/drawing/2014/main" id="{2E695C17-53B3-4429-90AC-F87CE58227A0}"/>
               </a:ext>
             </a:extLst>
@@ -39649,7 +40717,7 @@
 </p:sld>
 </file>
 
-<file path=ppt/slides/slide41.xml><?xml version="1.0" encoding="utf-8"?>
+<file path=ppt/slides/slide44.xml><?xml version="1.0" encoding="utf-8"?>
 <p:sld xmlns:a="http://schemas.openxmlformats.org/drawingml/2006/main" xmlns:r="http://schemas.openxmlformats.org/officeDocument/2006/relationships" xmlns:p="http://schemas.openxmlformats.org/presentationml/2006/main">
   <p:cSld>
     <p:spTree>
@@ -40047,7 +41115,7 @@
 </p:sld>
 </file>
 
-<file path=ppt/slides/slide42.xml><?xml version="1.0" encoding="utf-8"?>
+<file path=ppt/slides/slide45.xml><?xml version="1.0" encoding="utf-8"?>
 <p:sld xmlns:a="http://schemas.openxmlformats.org/drawingml/2006/main" xmlns:r="http://schemas.openxmlformats.org/officeDocument/2006/relationships" xmlns:p="http://schemas.openxmlformats.org/presentationml/2006/main">
   <p:cSld>
     <p:spTree>
@@ -40480,7 +41548,7 @@
 </p:sld>
 </file>
 
-<file path=ppt/slides/slide43.xml><?xml version="1.0" encoding="utf-8"?>
+<file path=ppt/slides/slide46.xml><?xml version="1.0" encoding="utf-8"?>
 <p:sld xmlns:a="http://schemas.openxmlformats.org/drawingml/2006/main" xmlns:r="http://schemas.openxmlformats.org/officeDocument/2006/relationships" xmlns:p="http://schemas.openxmlformats.org/presentationml/2006/main">
   <p:cSld>
     <p:spTree>
@@ -41024,7 +42092,7 @@
 </p:sld>
 </file>
 
-<file path=ppt/slides/slide44.xml><?xml version="1.0" encoding="utf-8"?>
+<file path=ppt/slides/slide47.xml><?xml version="1.0" encoding="utf-8"?>
 <p:sld xmlns:a="http://schemas.openxmlformats.org/drawingml/2006/main" xmlns:r="http://schemas.openxmlformats.org/officeDocument/2006/relationships" xmlns:p="http://schemas.openxmlformats.org/presentationml/2006/main">
   <p:cSld>
     <p:spTree>
@@ -41369,7 +42437,7 @@
 </p:sld>
 </file>
 
-<file path=ppt/slides/slide45.xml><?xml version="1.0" encoding="utf-8"?>
+<file path=ppt/slides/slide48.xml><?xml version="1.0" encoding="utf-8"?>
 <p:sld xmlns:a="http://schemas.openxmlformats.org/drawingml/2006/main" xmlns:r="http://schemas.openxmlformats.org/officeDocument/2006/relationships" xmlns:p="http://schemas.openxmlformats.org/presentationml/2006/main">
   <p:cSld>
     <p:spTree>
@@ -41730,7 +42798,7 @@
 </p:sld>
 </file>
 
-<file path=ppt/slides/slide46.xml><?xml version="1.0" encoding="utf-8"?>
+<file path=ppt/slides/slide49.xml><?xml version="1.0" encoding="utf-8"?>
 <p:sld xmlns:a="http://schemas.openxmlformats.org/drawingml/2006/main" xmlns:r="http://schemas.openxmlformats.org/officeDocument/2006/relationships" xmlns:p="http://schemas.openxmlformats.org/presentationml/2006/main">
   <p:cSld>
     <p:spTree>
@@ -42242,7 +43310,441 @@
 </p:sld>
 </file>
 
-<file path=ppt/slides/slide47.xml><?xml version="1.0" encoding="utf-8"?>
+<file path=ppt/slides/slide5.xml><?xml version="1.0" encoding="utf-8"?>
+<p:sld xmlns:a="http://schemas.openxmlformats.org/drawingml/2006/main" xmlns:r="http://schemas.openxmlformats.org/officeDocument/2006/relationships" xmlns:p="http://schemas.openxmlformats.org/presentationml/2006/main">
+  <p:cSld>
+    <p:spTree>
+      <p:nvGrpSpPr>
+        <p:cNvPr id="1" name=""/>
+        <p:cNvGrpSpPr/>
+        <p:nvPr/>
+      </p:nvGrpSpPr>
+      <p:grpSpPr>
+        <a:xfrm>
+          <a:off x="0" y="0"/>
+          <a:ext cx="0" cy="0"/>
+          <a:chOff x="0" y="0"/>
+          <a:chExt cx="0" cy="0"/>
+        </a:xfrm>
+      </p:grpSpPr>
+      <p:sp>
+        <p:nvSpPr>
+          <p:cNvPr id="2" name="제목 1">
+            <a:extLst>
+              <a:ext uri="{FF2B5EF4-FFF2-40B4-BE49-F238E27FC236}">
+                <a16:creationId xmlns:a16="http://schemas.microsoft.com/office/drawing/2014/main" id="{877EFE14-C7A7-4A12-B59F-1D977718C580}"/>
+              </a:ext>
+            </a:extLst>
+          </p:cNvPr>
+          <p:cNvSpPr>
+            <a:spLocks noGrp="1"/>
+          </p:cNvSpPr>
+          <p:nvPr>
+            <p:ph type="title"/>
+          </p:nvPr>
+        </p:nvSpPr>
+        <p:spPr/>
+        <p:txBody>
+          <a:bodyPr/>
+          <a:lstStyle/>
+          <a:p>
+            <a:r>
+              <a:rPr lang="ko-KR" altLang="en-US" dirty="0"/>
+              <a:t>벡터의 표현</a:t>
+            </a:r>
+          </a:p>
+        </p:txBody>
+      </p:sp>
+      <mc:AlternateContent xmlns:mc="http://schemas.openxmlformats.org/markup-compatibility/2006" xmlns:a14="http://schemas.microsoft.com/office/drawing/2010/main">
+        <mc:Choice Requires="a14">
+          <p:sp>
+            <p:nvSpPr>
+              <p:cNvPr id="3" name="내용 개체 틀 2">
+                <a:extLst>
+                  <a:ext uri="{FF2B5EF4-FFF2-40B4-BE49-F238E27FC236}">
+                    <a16:creationId xmlns:a16="http://schemas.microsoft.com/office/drawing/2014/main" id="{29C4F371-3F14-496F-B08F-27E75770204C}"/>
+                  </a:ext>
+                </a:extLst>
+              </p:cNvPr>
+              <p:cNvSpPr>
+                <a:spLocks noGrp="1"/>
+              </p:cNvSpPr>
+              <p:nvPr>
+                <p:ph idx="1"/>
+              </p:nvPr>
+            </p:nvSpPr>
+            <p:spPr>
+              <a:xfrm>
+                <a:off x="838200" y="1825625"/>
+                <a:ext cx="10515600" cy="4351338"/>
+              </a:xfrm>
+            </p:spPr>
+            <p:txBody>
+              <a:bodyPr/>
+              <a:lstStyle/>
+              <a:p>
+                <a14:m>
+                  <m:oMath xmlns:m="http://schemas.openxmlformats.org/officeDocument/2006/math">
+                    <m:r>
+                      <a:rPr lang="en-US" altLang="ko-KR" b="1" i="0" smtClean="0">
+                        <a:latin typeface="Cambria Math" panose="02040503050406030204" pitchFamily="18" charset="0"/>
+                      </a:rPr>
+                      <m:t>𝐮</m:t>
+                    </m:r>
+                    <m:r>
+                      <a:rPr lang="en-US" altLang="ko-KR" b="0" i="1" smtClean="0">
+                        <a:latin typeface="Cambria Math" panose="02040503050406030204" pitchFamily="18" charset="0"/>
+                      </a:rPr>
+                      <m:t>=</m:t>
+                    </m:r>
+                    <m:d>
+                      <m:dPr>
+                        <m:begChr m:val="["/>
+                        <m:endChr m:val="]"/>
+                        <m:ctrlPr>
+                          <a:rPr lang="en-US" altLang="ko-KR" b="0" i="1" smtClean="0">
+                            <a:latin typeface="Cambria Math" panose="02040503050406030204" pitchFamily="18" charset="0"/>
+                          </a:rPr>
+                        </m:ctrlPr>
+                      </m:dPr>
+                      <m:e>
+                        <m:eqArr>
+                          <m:eqArrPr>
+                            <m:ctrlPr>
+                              <a:rPr lang="en-US" altLang="ko-KR" b="0" i="1" smtClean="0">
+                                <a:latin typeface="Cambria Math" panose="02040503050406030204" pitchFamily="18" charset="0"/>
+                              </a:rPr>
+                            </m:ctrlPr>
+                          </m:eqArrPr>
+                          <m:e>
+                            <m:r>
+                              <a:rPr lang="en-US" altLang="ko-KR" b="0" i="1" smtClean="0">
+                                <a:latin typeface="Cambria Math" panose="02040503050406030204" pitchFamily="18" charset="0"/>
+                              </a:rPr>
+                              <m:t>1</m:t>
+                            </m:r>
+                          </m:e>
+                          <m:e>
+                            <m:r>
+                              <a:rPr lang="en-US" altLang="ko-KR" b="0" i="1" smtClean="0">
+                                <a:latin typeface="Cambria Math" panose="02040503050406030204" pitchFamily="18" charset="0"/>
+                              </a:rPr>
+                              <m:t>2</m:t>
+                            </m:r>
+                          </m:e>
+                        </m:eqArr>
+                      </m:e>
+                    </m:d>
+                  </m:oMath>
+                </a14:m>
+                <a:r>
+                  <a:rPr lang="en-US" altLang="ko-KR" b="0" dirty="0"/>
+                  <a:t> (</a:t>
+                </a:r>
+                <a:r>
+                  <a:rPr lang="ko-KR" altLang="en-US" b="0" dirty="0"/>
+                  <a:t>크기가</a:t>
+                </a:r>
+                <a:r>
+                  <a:rPr lang="en-US" altLang="ko-KR" dirty="0"/>
+                  <a:t> 2</a:t>
+                </a:r>
+                <a:r>
+                  <a:rPr lang="ko-KR" altLang="en-US" dirty="0"/>
+                  <a:t>인</a:t>
+                </a:r>
+                <a:r>
+                  <a:rPr lang="ko-KR" altLang="en-US" b="0" dirty="0"/>
+                  <a:t> 열 벡터</a:t>
+                </a:r>
+                <a:r>
+                  <a:rPr lang="en-US" altLang="ko-KR" b="0" dirty="0"/>
+                  <a:t>)</a:t>
+                </a:r>
+              </a:p>
+              <a:p>
+                <a14:m>
+                  <m:oMath xmlns:m="http://schemas.openxmlformats.org/officeDocument/2006/math">
+                    <m:r>
+                      <a:rPr lang="en-US" altLang="ko-KR" b="1" i="0" dirty="0" smtClean="0">
+                        <a:latin typeface="Cambria Math" panose="02040503050406030204" pitchFamily="18" charset="0"/>
+                      </a:rPr>
+                      <m:t>𝐯</m:t>
+                    </m:r>
+                    <m:r>
+                      <a:rPr lang="en-US" altLang="ko-KR" b="0" i="1" dirty="0" smtClean="0">
+                        <a:latin typeface="Cambria Math" panose="02040503050406030204" pitchFamily="18" charset="0"/>
+                      </a:rPr>
+                      <m:t>=</m:t>
+                    </m:r>
+                    <m:d>
+                      <m:dPr>
+                        <m:begChr m:val="["/>
+                        <m:endChr m:val="]"/>
+                        <m:ctrlPr>
+                          <a:rPr lang="en-US" altLang="ko-KR" b="0" i="1" dirty="0" smtClean="0">
+                            <a:latin typeface="Cambria Math" panose="02040503050406030204" pitchFamily="18" charset="0"/>
+                          </a:rPr>
+                        </m:ctrlPr>
+                      </m:dPr>
+                      <m:e>
+                        <m:m>
+                          <m:mPr>
+                            <m:mcs>
+                              <m:mc>
+                                <m:mcPr>
+                                  <m:count m:val="1"/>
+                                  <m:mcJc m:val="center"/>
+                                </m:mcPr>
+                              </m:mc>
+                            </m:mcs>
+                            <m:ctrlPr>
+                              <a:rPr lang="en-US" altLang="ko-KR" b="0" i="1" dirty="0" smtClean="0">
+                                <a:latin typeface="Cambria Math" panose="02040503050406030204" pitchFamily="18" charset="0"/>
+                              </a:rPr>
+                            </m:ctrlPr>
+                          </m:mPr>
+                          <m:mr>
+                            <m:e>
+                              <m:r>
+                                <m:rPr>
+                                  <m:brk m:alnAt="7"/>
+                                </m:rPr>
+                                <a:rPr lang="en-US" altLang="ko-KR" b="0" i="1" dirty="0" smtClean="0">
+                                  <a:latin typeface="Cambria Math" panose="02040503050406030204" pitchFamily="18" charset="0"/>
+                                </a:rPr>
+                                <m:t>1</m:t>
+                              </m:r>
+                            </m:e>
+                          </m:mr>
+                          <m:mr>
+                            <m:e>
+                              <m:r>
+                                <a:rPr lang="en-US" altLang="ko-KR" b="0" i="1" dirty="0" smtClean="0">
+                                  <a:latin typeface="Cambria Math" panose="02040503050406030204" pitchFamily="18" charset="0"/>
+                                </a:rPr>
+                                <m:t>2</m:t>
+                              </m:r>
+                            </m:e>
+                          </m:mr>
+                          <m:mr>
+                            <m:e>
+                              <m:r>
+                                <a:rPr lang="en-US" altLang="ko-KR" b="0" i="1" dirty="0" smtClean="0">
+                                  <a:latin typeface="Cambria Math" panose="02040503050406030204" pitchFamily="18" charset="0"/>
+                                </a:rPr>
+                                <m:t>3</m:t>
+                              </m:r>
+                            </m:e>
+                          </m:mr>
+                        </m:m>
+                      </m:e>
+                    </m:d>
+                  </m:oMath>
+                </a14:m>
+                <a:r>
+                  <a:rPr lang="en-US" altLang="ko-KR" b="0" dirty="0"/>
+                  <a:t> (</a:t>
+                </a:r>
+                <a:r>
+                  <a:rPr lang="ko-KR" altLang="en-US" b="0" dirty="0"/>
+                  <a:t>크기가 </a:t>
+                </a:r>
+                <a:r>
+                  <a:rPr lang="en-US" altLang="ko-KR" b="0" dirty="0"/>
+                  <a:t>3</a:t>
+                </a:r>
+                <a:r>
+                  <a:rPr lang="ko-KR" altLang="en-US" b="0" dirty="0"/>
+                  <a:t>인 열 벡터</a:t>
+                </a:r>
+                <a:r>
+                  <a:rPr lang="en-US" altLang="ko-KR" b="0" dirty="0"/>
+                  <a:t>)</a:t>
+                </a:r>
+              </a:p>
+              <a:p>
+                <a14:m>
+                  <m:oMath xmlns:m="http://schemas.openxmlformats.org/officeDocument/2006/math">
+                    <m:r>
+                      <a:rPr lang="en-US" altLang="ko-KR" b="1" i="0" smtClean="0">
+                        <a:latin typeface="Cambria Math" panose="02040503050406030204" pitchFamily="18" charset="0"/>
+                      </a:rPr>
+                      <m:t>𝐰</m:t>
+                    </m:r>
+                    <m:r>
+                      <a:rPr lang="en-US" altLang="ko-KR" b="0" i="1" smtClean="0">
+                        <a:latin typeface="Cambria Math" panose="02040503050406030204" pitchFamily="18" charset="0"/>
+                      </a:rPr>
+                      <m:t>=</m:t>
+                    </m:r>
+                    <m:d>
+                      <m:dPr>
+                        <m:begChr m:val="["/>
+                        <m:endChr m:val="]"/>
+                        <m:ctrlPr>
+                          <a:rPr lang="en-US" altLang="ko-KR" b="0" i="1" smtClean="0">
+                            <a:latin typeface="Cambria Math" panose="02040503050406030204" pitchFamily="18" charset="0"/>
+                          </a:rPr>
+                        </m:ctrlPr>
+                      </m:dPr>
+                      <m:e>
+                        <m:m>
+                          <m:mPr>
+                            <m:mcs>
+                              <m:mc>
+                                <m:mcPr>
+                                  <m:count m:val="1"/>
+                                  <m:mcJc m:val="center"/>
+                                </m:mcPr>
+                              </m:mc>
+                            </m:mcs>
+                            <m:ctrlPr>
+                              <a:rPr lang="en-US" altLang="ko-KR" b="0" i="1" smtClean="0">
+                                <a:latin typeface="Cambria Math" panose="02040503050406030204" pitchFamily="18" charset="0"/>
+                              </a:rPr>
+                            </m:ctrlPr>
+                          </m:mPr>
+                          <m:mr>
+                            <m:e>
+                              <m:r>
+                                <m:rPr>
+                                  <m:brk m:alnAt="7"/>
+                                </m:rPr>
+                                <a:rPr lang="en-US" altLang="ko-KR" b="0" i="1" smtClean="0">
+                                  <a:latin typeface="Cambria Math" panose="02040503050406030204" pitchFamily="18" charset="0"/>
+                                </a:rPr>
+                                <m:t>1</m:t>
+                              </m:r>
+                            </m:e>
+                          </m:mr>
+                          <m:mr>
+                            <m:e>
+                              <m:r>
+                                <a:rPr lang="en-US" altLang="ko-KR" b="0" i="1" smtClean="0">
+                                  <a:latin typeface="Cambria Math" panose="02040503050406030204" pitchFamily="18" charset="0"/>
+                                </a:rPr>
+                                <m:t>2</m:t>
+                              </m:r>
+                            </m:e>
+                          </m:mr>
+                          <m:mr>
+                            <m:e>
+                              <m:eqArr>
+                                <m:eqArrPr>
+                                  <m:ctrlPr>
+                                    <a:rPr lang="en-US" altLang="ko-KR" b="0" i="1" smtClean="0">
+                                      <a:latin typeface="Cambria Math" panose="02040503050406030204" pitchFamily="18" charset="0"/>
+                                    </a:rPr>
+                                  </m:ctrlPr>
+                                </m:eqArrPr>
+                                <m:e>
+                                  <m:r>
+                                    <a:rPr lang="en-US" altLang="ko-KR" b="0" i="1" smtClean="0">
+                                      <a:latin typeface="Cambria Math" panose="02040503050406030204" pitchFamily="18" charset="0"/>
+                                    </a:rPr>
+                                    <m:t>3</m:t>
+                                  </m:r>
+                                </m:e>
+                                <m:e>
+                                  <m:r>
+                                    <a:rPr lang="en-US" altLang="ko-KR" b="0" i="1" smtClean="0">
+                                      <a:latin typeface="Cambria Math" panose="02040503050406030204" pitchFamily="18" charset="0"/>
+                                    </a:rPr>
+                                    <m:t>4</m:t>
+                                  </m:r>
+                                </m:e>
+                              </m:eqArr>
+                            </m:e>
+                          </m:mr>
+                        </m:m>
+                      </m:e>
+                    </m:d>
+                  </m:oMath>
+                </a14:m>
+                <a:r>
+                  <a:rPr lang="en-US" altLang="ko-KR" dirty="0"/>
+                  <a:t> (</a:t>
+                </a:r>
+                <a:r>
+                  <a:rPr lang="ko-KR" altLang="en-US" dirty="0"/>
+                  <a:t>크기가 </a:t>
+                </a:r>
+                <a:r>
+                  <a:rPr lang="en-US" altLang="ko-KR" dirty="0"/>
+                  <a:t>4</a:t>
+                </a:r>
+                <a:r>
+                  <a:rPr lang="ko-KR" altLang="en-US" dirty="0"/>
+                  <a:t>인 열 벡터</a:t>
+                </a:r>
+                <a:r>
+                  <a:rPr lang="en-US" altLang="ko-KR" dirty="0"/>
+                  <a:t>)</a:t>
+                </a:r>
+                <a:endParaRPr lang="ko-KR" altLang="en-US" dirty="0"/>
+              </a:p>
+            </p:txBody>
+          </p:sp>
+        </mc:Choice>
+        <mc:Fallback xmlns="">
+          <p:sp>
+            <p:nvSpPr>
+              <p:cNvPr id="3" name="내용 개체 틀 2">
+                <a:extLst>
+                  <a:ext uri="{FF2B5EF4-FFF2-40B4-BE49-F238E27FC236}">
+                    <a16:creationId xmlns:a16="http://schemas.microsoft.com/office/drawing/2014/main" id="{29C4F371-3F14-496F-B08F-27E75770204C}"/>
+                  </a:ext>
+                </a:extLst>
+              </p:cNvPr>
+              <p:cNvSpPr>
+                <a:spLocks noGrp="1" noRot="1" noChangeAspect="1" noMove="1" noResize="1" noEditPoints="1" noAdjustHandles="1" noChangeArrowheads="1" noChangeShapeType="1" noTextEdit="1"/>
+              </p:cNvSpPr>
+              <p:nvPr>
+                <p:ph idx="1"/>
+              </p:nvPr>
+            </p:nvSpPr>
+            <p:spPr>
+              <a:xfrm>
+                <a:off x="838200" y="1825625"/>
+                <a:ext cx="10515600" cy="4351338"/>
+              </a:xfrm>
+              <a:blipFill>
+                <a:blip r:embed="rId2"/>
+                <a:stretch>
+                  <a:fillRect/>
+                </a:stretch>
+              </a:blipFill>
+            </p:spPr>
+            <p:txBody>
+              <a:bodyPr/>
+              <a:lstStyle/>
+              <a:p>
+                <a:r>
+                  <a:rPr lang="ko-KR" altLang="en-US">
+                    <a:noFill/>
+                  </a:rPr>
+                  <a:t> </a:t>
+                </a:r>
+              </a:p>
+            </p:txBody>
+          </p:sp>
+        </mc:Fallback>
+      </mc:AlternateContent>
+    </p:spTree>
+    <p:extLst>
+      <p:ext uri="{BB962C8B-B14F-4D97-AF65-F5344CB8AC3E}">
+        <p14:creationId xmlns:p14="http://schemas.microsoft.com/office/powerpoint/2010/main" val="127107757"/>
+      </p:ext>
+    </p:extLst>
+  </p:cSld>
+  <p:clrMapOvr>
+    <a:masterClrMapping/>
+  </p:clrMapOvr>
+</p:sld>
+</file>
+
+<file path=ppt/slides/slide50.xml><?xml version="1.0" encoding="utf-8"?>
 <p:sld xmlns:a="http://schemas.openxmlformats.org/drawingml/2006/main" xmlns:r="http://schemas.openxmlformats.org/officeDocument/2006/relationships" xmlns:p="http://schemas.openxmlformats.org/presentationml/2006/main">
   <p:cSld>
     <p:spTree>
@@ -42724,7 +44226,7 @@
 </p:sld>
 </file>
 
-<file path=ppt/slides/slide48.xml><?xml version="1.0" encoding="utf-8"?>
+<file path=ppt/slides/slide51.xml><?xml version="1.0" encoding="utf-8"?>
 <p:sld xmlns:a="http://schemas.openxmlformats.org/drawingml/2006/main" xmlns:r="http://schemas.openxmlformats.org/officeDocument/2006/relationships" xmlns:p="http://schemas.openxmlformats.org/presentationml/2006/main">
   <p:cSld>
     <p:spTree>
@@ -42948,7 +44450,7 @@
 </p:sld>
 </file>
 
-<file path=ppt/slides/slide49.xml><?xml version="1.0" encoding="utf-8"?>
+<file path=ppt/slides/slide52.xml><?xml version="1.0" encoding="utf-8"?>
 <p:sld xmlns:a="http://schemas.openxmlformats.org/drawingml/2006/main" xmlns:r="http://schemas.openxmlformats.org/officeDocument/2006/relationships" xmlns:p="http://schemas.openxmlformats.org/presentationml/2006/main">
   <p:cSld>
     <p:spTree>
@@ -43126,441 +44628,7 @@
 </p:sld>
 </file>
 
-<file path=ppt/slides/slide5.xml><?xml version="1.0" encoding="utf-8"?>
-<p:sld xmlns:a="http://schemas.openxmlformats.org/drawingml/2006/main" xmlns:r="http://schemas.openxmlformats.org/officeDocument/2006/relationships" xmlns:p="http://schemas.openxmlformats.org/presentationml/2006/main">
-  <p:cSld>
-    <p:spTree>
-      <p:nvGrpSpPr>
-        <p:cNvPr id="1" name=""/>
-        <p:cNvGrpSpPr/>
-        <p:nvPr/>
-      </p:nvGrpSpPr>
-      <p:grpSpPr>
-        <a:xfrm>
-          <a:off x="0" y="0"/>
-          <a:ext cx="0" cy="0"/>
-          <a:chOff x="0" y="0"/>
-          <a:chExt cx="0" cy="0"/>
-        </a:xfrm>
-      </p:grpSpPr>
-      <p:sp>
-        <p:nvSpPr>
-          <p:cNvPr id="2" name="제목 1">
-            <a:extLst>
-              <a:ext uri="{FF2B5EF4-FFF2-40B4-BE49-F238E27FC236}">
-                <a16:creationId xmlns:a16="http://schemas.microsoft.com/office/drawing/2014/main" id="{877EFE14-C7A7-4A12-B59F-1D977718C580}"/>
-              </a:ext>
-            </a:extLst>
-          </p:cNvPr>
-          <p:cNvSpPr>
-            <a:spLocks noGrp="1"/>
-          </p:cNvSpPr>
-          <p:nvPr>
-            <p:ph type="title"/>
-          </p:nvPr>
-        </p:nvSpPr>
-        <p:spPr/>
-        <p:txBody>
-          <a:bodyPr/>
-          <a:lstStyle/>
-          <a:p>
-            <a:r>
-              <a:rPr lang="ko-KR" altLang="en-US" dirty="0"/>
-              <a:t>벡터의 표현</a:t>
-            </a:r>
-          </a:p>
-        </p:txBody>
-      </p:sp>
-      <mc:AlternateContent xmlns:mc="http://schemas.openxmlformats.org/markup-compatibility/2006" xmlns:a14="http://schemas.microsoft.com/office/drawing/2010/main">
-        <mc:Choice Requires="a14">
-          <p:sp>
-            <p:nvSpPr>
-              <p:cNvPr id="3" name="내용 개체 틀 2">
-                <a:extLst>
-                  <a:ext uri="{FF2B5EF4-FFF2-40B4-BE49-F238E27FC236}">
-                    <a16:creationId xmlns:a16="http://schemas.microsoft.com/office/drawing/2014/main" id="{29C4F371-3F14-496F-B08F-27E75770204C}"/>
-                  </a:ext>
-                </a:extLst>
-              </p:cNvPr>
-              <p:cNvSpPr>
-                <a:spLocks noGrp="1"/>
-              </p:cNvSpPr>
-              <p:nvPr>
-                <p:ph idx="1"/>
-              </p:nvPr>
-            </p:nvSpPr>
-            <p:spPr>
-              <a:xfrm>
-                <a:off x="838200" y="1825625"/>
-                <a:ext cx="10515600" cy="4351338"/>
-              </a:xfrm>
-            </p:spPr>
-            <p:txBody>
-              <a:bodyPr/>
-              <a:lstStyle/>
-              <a:p>
-                <a14:m>
-                  <m:oMath xmlns:m="http://schemas.openxmlformats.org/officeDocument/2006/math">
-                    <m:r>
-                      <a:rPr lang="en-US" altLang="ko-KR" b="1" i="0" smtClean="0">
-                        <a:latin typeface="Cambria Math" panose="02040503050406030204" pitchFamily="18" charset="0"/>
-                      </a:rPr>
-                      <m:t>𝐮</m:t>
-                    </m:r>
-                    <m:r>
-                      <a:rPr lang="en-US" altLang="ko-KR" b="0" i="1" smtClean="0">
-                        <a:latin typeface="Cambria Math" panose="02040503050406030204" pitchFamily="18" charset="0"/>
-                      </a:rPr>
-                      <m:t>=</m:t>
-                    </m:r>
-                    <m:d>
-                      <m:dPr>
-                        <m:begChr m:val="["/>
-                        <m:endChr m:val="]"/>
-                        <m:ctrlPr>
-                          <a:rPr lang="en-US" altLang="ko-KR" b="0" i="1" smtClean="0">
-                            <a:latin typeface="Cambria Math" panose="02040503050406030204" pitchFamily="18" charset="0"/>
-                          </a:rPr>
-                        </m:ctrlPr>
-                      </m:dPr>
-                      <m:e>
-                        <m:eqArr>
-                          <m:eqArrPr>
-                            <m:ctrlPr>
-                              <a:rPr lang="en-US" altLang="ko-KR" b="0" i="1" smtClean="0">
-                                <a:latin typeface="Cambria Math" panose="02040503050406030204" pitchFamily="18" charset="0"/>
-                              </a:rPr>
-                            </m:ctrlPr>
-                          </m:eqArrPr>
-                          <m:e>
-                            <m:r>
-                              <a:rPr lang="en-US" altLang="ko-KR" b="0" i="1" smtClean="0">
-                                <a:latin typeface="Cambria Math" panose="02040503050406030204" pitchFamily="18" charset="0"/>
-                              </a:rPr>
-                              <m:t>1</m:t>
-                            </m:r>
-                          </m:e>
-                          <m:e>
-                            <m:r>
-                              <a:rPr lang="en-US" altLang="ko-KR" b="0" i="1" smtClean="0">
-                                <a:latin typeface="Cambria Math" panose="02040503050406030204" pitchFamily="18" charset="0"/>
-                              </a:rPr>
-                              <m:t>2</m:t>
-                            </m:r>
-                          </m:e>
-                        </m:eqArr>
-                      </m:e>
-                    </m:d>
-                  </m:oMath>
-                </a14:m>
-                <a:r>
-                  <a:rPr lang="en-US" altLang="ko-KR" b="0" dirty="0"/>
-                  <a:t> (</a:t>
-                </a:r>
-                <a:r>
-                  <a:rPr lang="ko-KR" altLang="en-US" b="0" dirty="0"/>
-                  <a:t>크기가</a:t>
-                </a:r>
-                <a:r>
-                  <a:rPr lang="en-US" altLang="ko-KR" dirty="0"/>
-                  <a:t> 2</a:t>
-                </a:r>
-                <a:r>
-                  <a:rPr lang="ko-KR" altLang="en-US" dirty="0"/>
-                  <a:t>인</a:t>
-                </a:r>
-                <a:r>
-                  <a:rPr lang="ko-KR" altLang="en-US" b="0" dirty="0"/>
-                  <a:t> 열 벡터</a:t>
-                </a:r>
-                <a:r>
-                  <a:rPr lang="en-US" altLang="ko-KR" b="0" dirty="0"/>
-                  <a:t>)</a:t>
-                </a:r>
-              </a:p>
-              <a:p>
-                <a14:m>
-                  <m:oMath xmlns:m="http://schemas.openxmlformats.org/officeDocument/2006/math">
-                    <m:r>
-                      <a:rPr lang="en-US" altLang="ko-KR" b="1" i="0" dirty="0" smtClean="0">
-                        <a:latin typeface="Cambria Math" panose="02040503050406030204" pitchFamily="18" charset="0"/>
-                      </a:rPr>
-                      <m:t>𝐯</m:t>
-                    </m:r>
-                    <m:r>
-                      <a:rPr lang="en-US" altLang="ko-KR" b="0" i="1" dirty="0" smtClean="0">
-                        <a:latin typeface="Cambria Math" panose="02040503050406030204" pitchFamily="18" charset="0"/>
-                      </a:rPr>
-                      <m:t>=</m:t>
-                    </m:r>
-                    <m:d>
-                      <m:dPr>
-                        <m:begChr m:val="["/>
-                        <m:endChr m:val="]"/>
-                        <m:ctrlPr>
-                          <a:rPr lang="en-US" altLang="ko-KR" b="0" i="1" dirty="0" smtClean="0">
-                            <a:latin typeface="Cambria Math" panose="02040503050406030204" pitchFamily="18" charset="0"/>
-                          </a:rPr>
-                        </m:ctrlPr>
-                      </m:dPr>
-                      <m:e>
-                        <m:m>
-                          <m:mPr>
-                            <m:mcs>
-                              <m:mc>
-                                <m:mcPr>
-                                  <m:count m:val="1"/>
-                                  <m:mcJc m:val="center"/>
-                                </m:mcPr>
-                              </m:mc>
-                            </m:mcs>
-                            <m:ctrlPr>
-                              <a:rPr lang="en-US" altLang="ko-KR" b="0" i="1" dirty="0" smtClean="0">
-                                <a:latin typeface="Cambria Math" panose="02040503050406030204" pitchFamily="18" charset="0"/>
-                              </a:rPr>
-                            </m:ctrlPr>
-                          </m:mPr>
-                          <m:mr>
-                            <m:e>
-                              <m:r>
-                                <m:rPr>
-                                  <m:brk m:alnAt="7"/>
-                                </m:rPr>
-                                <a:rPr lang="en-US" altLang="ko-KR" b="0" i="1" dirty="0" smtClean="0">
-                                  <a:latin typeface="Cambria Math" panose="02040503050406030204" pitchFamily="18" charset="0"/>
-                                </a:rPr>
-                                <m:t>1</m:t>
-                              </m:r>
-                            </m:e>
-                          </m:mr>
-                          <m:mr>
-                            <m:e>
-                              <m:r>
-                                <a:rPr lang="en-US" altLang="ko-KR" b="0" i="1" dirty="0" smtClean="0">
-                                  <a:latin typeface="Cambria Math" panose="02040503050406030204" pitchFamily="18" charset="0"/>
-                                </a:rPr>
-                                <m:t>2</m:t>
-                              </m:r>
-                            </m:e>
-                          </m:mr>
-                          <m:mr>
-                            <m:e>
-                              <m:r>
-                                <a:rPr lang="en-US" altLang="ko-KR" b="0" i="1" dirty="0" smtClean="0">
-                                  <a:latin typeface="Cambria Math" panose="02040503050406030204" pitchFamily="18" charset="0"/>
-                                </a:rPr>
-                                <m:t>3</m:t>
-                              </m:r>
-                            </m:e>
-                          </m:mr>
-                        </m:m>
-                      </m:e>
-                    </m:d>
-                  </m:oMath>
-                </a14:m>
-                <a:r>
-                  <a:rPr lang="en-US" altLang="ko-KR" b="0" dirty="0"/>
-                  <a:t> (</a:t>
-                </a:r>
-                <a:r>
-                  <a:rPr lang="ko-KR" altLang="en-US" b="0" dirty="0"/>
-                  <a:t>크기가 </a:t>
-                </a:r>
-                <a:r>
-                  <a:rPr lang="en-US" altLang="ko-KR" b="0" dirty="0"/>
-                  <a:t>3</a:t>
-                </a:r>
-                <a:r>
-                  <a:rPr lang="ko-KR" altLang="en-US" b="0" dirty="0"/>
-                  <a:t>인 열 벡터</a:t>
-                </a:r>
-                <a:r>
-                  <a:rPr lang="en-US" altLang="ko-KR" b="0" dirty="0"/>
-                  <a:t>)</a:t>
-                </a:r>
-              </a:p>
-              <a:p>
-                <a14:m>
-                  <m:oMath xmlns:m="http://schemas.openxmlformats.org/officeDocument/2006/math">
-                    <m:r>
-                      <a:rPr lang="en-US" altLang="ko-KR" b="1" i="0" smtClean="0">
-                        <a:latin typeface="Cambria Math" panose="02040503050406030204" pitchFamily="18" charset="0"/>
-                      </a:rPr>
-                      <m:t>𝐰</m:t>
-                    </m:r>
-                    <m:r>
-                      <a:rPr lang="en-US" altLang="ko-KR" b="0" i="1" smtClean="0">
-                        <a:latin typeface="Cambria Math" panose="02040503050406030204" pitchFamily="18" charset="0"/>
-                      </a:rPr>
-                      <m:t>=</m:t>
-                    </m:r>
-                    <m:d>
-                      <m:dPr>
-                        <m:begChr m:val="["/>
-                        <m:endChr m:val="]"/>
-                        <m:ctrlPr>
-                          <a:rPr lang="en-US" altLang="ko-KR" b="0" i="1" smtClean="0">
-                            <a:latin typeface="Cambria Math" panose="02040503050406030204" pitchFamily="18" charset="0"/>
-                          </a:rPr>
-                        </m:ctrlPr>
-                      </m:dPr>
-                      <m:e>
-                        <m:m>
-                          <m:mPr>
-                            <m:mcs>
-                              <m:mc>
-                                <m:mcPr>
-                                  <m:count m:val="1"/>
-                                  <m:mcJc m:val="center"/>
-                                </m:mcPr>
-                              </m:mc>
-                            </m:mcs>
-                            <m:ctrlPr>
-                              <a:rPr lang="en-US" altLang="ko-KR" b="0" i="1" smtClean="0">
-                                <a:latin typeface="Cambria Math" panose="02040503050406030204" pitchFamily="18" charset="0"/>
-                              </a:rPr>
-                            </m:ctrlPr>
-                          </m:mPr>
-                          <m:mr>
-                            <m:e>
-                              <m:r>
-                                <m:rPr>
-                                  <m:brk m:alnAt="7"/>
-                                </m:rPr>
-                                <a:rPr lang="en-US" altLang="ko-KR" b="0" i="1" smtClean="0">
-                                  <a:latin typeface="Cambria Math" panose="02040503050406030204" pitchFamily="18" charset="0"/>
-                                </a:rPr>
-                                <m:t>1</m:t>
-                              </m:r>
-                            </m:e>
-                          </m:mr>
-                          <m:mr>
-                            <m:e>
-                              <m:r>
-                                <a:rPr lang="en-US" altLang="ko-KR" b="0" i="1" smtClean="0">
-                                  <a:latin typeface="Cambria Math" panose="02040503050406030204" pitchFamily="18" charset="0"/>
-                                </a:rPr>
-                                <m:t>2</m:t>
-                              </m:r>
-                            </m:e>
-                          </m:mr>
-                          <m:mr>
-                            <m:e>
-                              <m:eqArr>
-                                <m:eqArrPr>
-                                  <m:ctrlPr>
-                                    <a:rPr lang="en-US" altLang="ko-KR" b="0" i="1" smtClean="0">
-                                      <a:latin typeface="Cambria Math" panose="02040503050406030204" pitchFamily="18" charset="0"/>
-                                    </a:rPr>
-                                  </m:ctrlPr>
-                                </m:eqArrPr>
-                                <m:e>
-                                  <m:r>
-                                    <a:rPr lang="en-US" altLang="ko-KR" b="0" i="1" smtClean="0">
-                                      <a:latin typeface="Cambria Math" panose="02040503050406030204" pitchFamily="18" charset="0"/>
-                                    </a:rPr>
-                                    <m:t>3</m:t>
-                                  </m:r>
-                                </m:e>
-                                <m:e>
-                                  <m:r>
-                                    <a:rPr lang="en-US" altLang="ko-KR" b="0" i="1" smtClean="0">
-                                      <a:latin typeface="Cambria Math" panose="02040503050406030204" pitchFamily="18" charset="0"/>
-                                    </a:rPr>
-                                    <m:t>4</m:t>
-                                  </m:r>
-                                </m:e>
-                              </m:eqArr>
-                            </m:e>
-                          </m:mr>
-                        </m:m>
-                      </m:e>
-                    </m:d>
-                  </m:oMath>
-                </a14:m>
-                <a:r>
-                  <a:rPr lang="en-US" altLang="ko-KR" dirty="0"/>
-                  <a:t> (</a:t>
-                </a:r>
-                <a:r>
-                  <a:rPr lang="ko-KR" altLang="en-US" dirty="0"/>
-                  <a:t>크기가 </a:t>
-                </a:r>
-                <a:r>
-                  <a:rPr lang="en-US" altLang="ko-KR" dirty="0"/>
-                  <a:t>4</a:t>
-                </a:r>
-                <a:r>
-                  <a:rPr lang="ko-KR" altLang="en-US" dirty="0"/>
-                  <a:t>인 열 벡터</a:t>
-                </a:r>
-                <a:r>
-                  <a:rPr lang="en-US" altLang="ko-KR" dirty="0"/>
-                  <a:t>)</a:t>
-                </a:r>
-                <a:endParaRPr lang="ko-KR" altLang="en-US" dirty="0"/>
-              </a:p>
-            </p:txBody>
-          </p:sp>
-        </mc:Choice>
-        <mc:Fallback xmlns="">
-          <p:sp>
-            <p:nvSpPr>
-              <p:cNvPr id="3" name="내용 개체 틀 2">
-                <a:extLst>
-                  <a:ext uri="{FF2B5EF4-FFF2-40B4-BE49-F238E27FC236}">
-                    <a16:creationId xmlns:a16="http://schemas.microsoft.com/office/drawing/2014/main" id="{29C4F371-3F14-496F-B08F-27E75770204C}"/>
-                  </a:ext>
-                </a:extLst>
-              </p:cNvPr>
-              <p:cNvSpPr>
-                <a:spLocks noGrp="1" noRot="1" noChangeAspect="1" noMove="1" noResize="1" noEditPoints="1" noAdjustHandles="1" noChangeArrowheads="1" noChangeShapeType="1" noTextEdit="1"/>
-              </p:cNvSpPr>
-              <p:nvPr>
-                <p:ph idx="1"/>
-              </p:nvPr>
-            </p:nvSpPr>
-            <p:spPr>
-              <a:xfrm>
-                <a:off x="838200" y="1825625"/>
-                <a:ext cx="10515600" cy="4351338"/>
-              </a:xfrm>
-              <a:blipFill>
-                <a:blip r:embed="rId2"/>
-                <a:stretch>
-                  <a:fillRect/>
-                </a:stretch>
-              </a:blipFill>
-            </p:spPr>
-            <p:txBody>
-              <a:bodyPr/>
-              <a:lstStyle/>
-              <a:p>
-                <a:r>
-                  <a:rPr lang="ko-KR" altLang="en-US">
-                    <a:noFill/>
-                  </a:rPr>
-                  <a:t> </a:t>
-                </a:r>
-              </a:p>
-            </p:txBody>
-          </p:sp>
-        </mc:Fallback>
-      </mc:AlternateContent>
-    </p:spTree>
-    <p:extLst>
-      <p:ext uri="{BB962C8B-B14F-4D97-AF65-F5344CB8AC3E}">
-        <p14:creationId xmlns:p14="http://schemas.microsoft.com/office/powerpoint/2010/main" val="127107757"/>
-      </p:ext>
-    </p:extLst>
-  </p:cSld>
-  <p:clrMapOvr>
-    <a:masterClrMapping/>
-  </p:clrMapOvr>
-</p:sld>
-</file>
-
-<file path=ppt/slides/slide50.xml><?xml version="1.0" encoding="utf-8"?>
+<file path=ppt/slides/slide53.xml><?xml version="1.0" encoding="utf-8"?>
 <p:sld xmlns:a="http://schemas.openxmlformats.org/drawingml/2006/main" xmlns:r="http://schemas.openxmlformats.org/officeDocument/2006/relationships" xmlns:p="http://schemas.openxmlformats.org/presentationml/2006/main">
   <p:cSld>
     <p:spTree>
@@ -47029,6 +48097,12 @@
 </file>
 
 <file path=customXml/item1.xml><?xml version="1.0" encoding="utf-8"?>
+<p:properties xmlns:p="http://schemas.microsoft.com/office/2006/metadata/properties" xmlns:xsi="http://www.w3.org/2001/XMLSchema-instance" xmlns:pc="http://schemas.microsoft.com/office/infopath/2007/PartnerControls">
+  <documentManagement/>
+</p:properties>
+</file>
+
+<file path=customXml/item2.xml><?xml version="1.0" encoding="utf-8"?>
 <ct:contentTypeSchema xmlns:ct="http://schemas.microsoft.com/office/2006/metadata/contentType" xmlns:ma="http://schemas.microsoft.com/office/2006/metadata/properties/metaAttributes" ct:_="" ma:_="" ma:contentTypeName="문서" ma:contentTypeID="0x010100724BE246D5096A49A61468620B4F694C" ma:contentTypeVersion="2" ma:contentTypeDescription="새 문서를 만듭니다." ma:contentTypeScope="" ma:versionID="ffc1fd754d50385c74eaa0c429a23f87">
   <xsd:schema xmlns:xsd="http://www.w3.org/2001/XMLSchema" xmlns:xs="http://www.w3.org/2001/XMLSchema" xmlns:p="http://schemas.microsoft.com/office/2006/metadata/properties" xmlns:ns3="0e4de794-19e7-4a03-8a25-6601fbe4a2ad" targetNamespace="http://schemas.microsoft.com/office/2006/metadata/properties" ma:root="true" ma:fieldsID="37d4eeb6abfbeb3504662c7bbcc66b17" ns3:_="">
     <xsd:import namespace="0e4de794-19e7-4a03-8a25-6601fbe4a2ad"/>
@@ -47160,12 +48234,6 @@
 </ct:contentTypeSchema>
 </file>
 
-<file path=customXml/item2.xml><?xml version="1.0" encoding="utf-8"?>
-<p:properties xmlns:p="http://schemas.microsoft.com/office/2006/metadata/properties" xmlns:xsi="http://www.w3.org/2001/XMLSchema-instance" xmlns:pc="http://schemas.microsoft.com/office/infopath/2007/PartnerControls">
-  <documentManagement/>
-</p:properties>
-</file>
-
 <file path=customXml/item3.xml><?xml version="1.0" encoding="utf-8"?>
 <?mso-contentType ?>
 <FormTemplates xmlns="http://schemas.microsoft.com/sharepoint/v3/contenttype/forms">
@@ -47176,6 +48244,22 @@
 </file>
 
 <file path=customXml/itemProps1.xml><?xml version="1.0" encoding="utf-8"?>
+<ds:datastoreItem xmlns:ds="http://schemas.openxmlformats.org/officeDocument/2006/customXml" ds:itemID="{78B8425E-138E-4BE1-A1A1-DEAF16F7CC80}">
+  <ds:schemaRefs>
+    <ds:schemaRef ds:uri="http://purl.org/dc/elements/1.1/"/>
+    <ds:schemaRef ds:uri="http://schemas.microsoft.com/office/2006/metadata/properties"/>
+    <ds:schemaRef ds:uri="http://purl.org/dc/terms/"/>
+    <ds:schemaRef ds:uri="http://schemas.openxmlformats.org/package/2006/metadata/core-properties"/>
+    <ds:schemaRef ds:uri="http://schemas.microsoft.com/office/2006/documentManagement/types"/>
+    <ds:schemaRef ds:uri="http://purl.org/dc/dcmitype/"/>
+    <ds:schemaRef ds:uri="http://schemas.microsoft.com/office/infopath/2007/PartnerControls"/>
+    <ds:schemaRef ds:uri="0e4de794-19e7-4a03-8a25-6601fbe4a2ad"/>
+    <ds:schemaRef ds:uri="http://www.w3.org/XML/1998/namespace"/>
+  </ds:schemaRefs>
+</ds:datastoreItem>
+</file>
+
+<file path=customXml/itemProps2.xml><?xml version="1.0" encoding="utf-8"?>
 <ds:datastoreItem xmlns:ds="http://schemas.openxmlformats.org/officeDocument/2006/customXml" ds:itemID="{08C9C6FB-1032-40F6-99A4-A36D9F16D83B}">
   <ds:schemaRefs>
     <ds:schemaRef ds:uri="http://schemas.microsoft.com/office/2006/metadata/contentType"/>
@@ -47194,22 +48278,6 @@
 </ds:datastoreItem>
 </file>
 
-<file path=customXml/itemProps2.xml><?xml version="1.0" encoding="utf-8"?>
-<ds:datastoreItem xmlns:ds="http://schemas.openxmlformats.org/officeDocument/2006/customXml" ds:itemID="{78B8425E-138E-4BE1-A1A1-DEAF16F7CC80}">
-  <ds:schemaRefs>
-    <ds:schemaRef ds:uri="http://purl.org/dc/terms/"/>
-    <ds:schemaRef ds:uri="http://schemas.openxmlformats.org/package/2006/metadata/core-properties"/>
-    <ds:schemaRef ds:uri="http://purl.org/dc/dcmitype/"/>
-    <ds:schemaRef ds:uri="http://schemas.microsoft.com/office/2006/documentManagement/types"/>
-    <ds:schemaRef ds:uri="0e4de794-19e7-4a03-8a25-6601fbe4a2ad"/>
-    <ds:schemaRef ds:uri="http://purl.org/dc/elements/1.1/"/>
-    <ds:schemaRef ds:uri="http://schemas.microsoft.com/office/2006/metadata/properties"/>
-    <ds:schemaRef ds:uri="http://schemas.microsoft.com/office/infopath/2007/PartnerControls"/>
-    <ds:schemaRef ds:uri="http://www.w3.org/XML/1998/namespace"/>
-  </ds:schemaRefs>
-</ds:datastoreItem>
-</file>
-
 <file path=customXml/itemProps3.xml><?xml version="1.0" encoding="utf-8"?>
 <ds:datastoreItem xmlns:ds="http://schemas.openxmlformats.org/officeDocument/2006/customXml" ds:itemID="{B94506D1-FFA9-47EE-B148-AFA604BEB1B8}">
   <ds:schemaRefs>

</xml_diff>